<commit_message>
apresentação e ajustes css.
</commit_message>
<xml_diff>
--- a/Docs/Apresentacao_projeto - Fluxo Telas (Esboco).pptx
+++ b/Docs/Apresentacao_projeto - Fluxo Telas (Esboco).pptx
@@ -20,7 +20,7 @@
     <p:sldId id="266" r:id="rId15"/>
     <p:sldId id="267" r:id="rId16"/>
   </p:sldIdLst>
-  <p:sldSz cx="9144000" cy="5143500"/>
+  <p:sldSz cx="9144000" cy="5145087"/>
   <p:notesSz cx="7559675" cy="10691812"/>
 </p:presentation>
 </file>
@@ -649,7 +649,7 @@
         <p:spPr>
           <a:xfrm>
             <a:off x="457200" y="1203480"/>
-            <a:ext cx="8229240" cy="2982960"/>
+            <a:ext cx="8229240" cy="2983320"/>
           </a:xfrm>
           <a:prstGeom prst="rect">
             <a:avLst/>
@@ -733,7 +733,7 @@
         <p:spPr>
           <a:xfrm>
             <a:off x="457200" y="1203480"/>
-            <a:ext cx="8229240" cy="2982960"/>
+            <a:ext cx="8229240" cy="2983320"/>
           </a:xfrm>
           <a:prstGeom prst="rect">
             <a:avLst/>
@@ -816,7 +816,7 @@
         <p:spPr>
           <a:xfrm>
             <a:off x="457200" y="1203480"/>
-            <a:ext cx="4015800" cy="2982960"/>
+            <a:ext cx="4015800" cy="2983320"/>
           </a:xfrm>
           <a:prstGeom prst="rect">
             <a:avLst/>
@@ -846,7 +846,7 @@
         <p:spPr>
           <a:xfrm>
             <a:off x="4674240" y="1203480"/>
-            <a:ext cx="4015800" cy="2982960"/>
+            <a:ext cx="4015800" cy="2983320"/>
           </a:xfrm>
           <a:prstGeom prst="rect">
             <a:avLst/>
@@ -1065,7 +1065,7 @@
         <p:spPr>
           <a:xfrm>
             <a:off x="4674240" y="1203480"/>
-            <a:ext cx="4015800" cy="2982960"/>
+            <a:ext cx="4015800" cy="2983320"/>
           </a:xfrm>
           <a:prstGeom prst="rect">
             <a:avLst/>
@@ -1178,7 +1178,7 @@
         <p:spPr>
           <a:xfrm>
             <a:off x="457200" y="1203480"/>
-            <a:ext cx="8229240" cy="2982960"/>
+            <a:ext cx="8229240" cy="2983320"/>
           </a:xfrm>
           <a:prstGeom prst="rect">
             <a:avLst/>
@@ -1262,7 +1262,7 @@
         <p:spPr>
           <a:xfrm>
             <a:off x="457200" y="1203480"/>
-            <a:ext cx="4015800" cy="2982960"/>
+            <a:ext cx="4015800" cy="2983320"/>
           </a:xfrm>
           <a:prstGeom prst="rect">
             <a:avLst/>
@@ -2089,7 +2089,7 @@
         <p:spPr>
           <a:xfrm>
             <a:off x="457200" y="1203480"/>
-            <a:ext cx="8229240" cy="2982960"/>
+            <a:ext cx="8229240" cy="2983320"/>
           </a:xfrm>
           <a:prstGeom prst="rect">
             <a:avLst/>
@@ -2173,7 +2173,7 @@
         <p:spPr>
           <a:xfrm>
             <a:off x="457200" y="1203480"/>
-            <a:ext cx="8229240" cy="2982960"/>
+            <a:ext cx="8229240" cy="2983320"/>
           </a:xfrm>
           <a:prstGeom prst="rect">
             <a:avLst/>
@@ -2256,7 +2256,7 @@
         <p:spPr>
           <a:xfrm>
             <a:off x="457200" y="1203480"/>
-            <a:ext cx="4015800" cy="2982960"/>
+            <a:ext cx="4015800" cy="2983320"/>
           </a:xfrm>
           <a:prstGeom prst="rect">
             <a:avLst/>
@@ -2286,7 +2286,7 @@
         <p:spPr>
           <a:xfrm>
             <a:off x="4674240" y="1203480"/>
-            <a:ext cx="4015800" cy="2982960"/>
+            <a:ext cx="4015800" cy="2983320"/>
           </a:xfrm>
           <a:prstGeom prst="rect">
             <a:avLst/>
@@ -2422,7 +2422,7 @@
         <p:spPr>
           <a:xfrm>
             <a:off x="457200" y="1203480"/>
-            <a:ext cx="8229240" cy="2982960"/>
+            <a:ext cx="8229240" cy="2983320"/>
           </a:xfrm>
           <a:prstGeom prst="rect">
             <a:avLst/>
@@ -2588,7 +2588,7 @@
         <p:spPr>
           <a:xfrm>
             <a:off x="4674240" y="1203480"/>
-            <a:ext cx="4015800" cy="2982960"/>
+            <a:ext cx="4015800" cy="2983320"/>
           </a:xfrm>
           <a:prstGeom prst="rect">
             <a:avLst/>
@@ -2701,7 +2701,7 @@
         <p:spPr>
           <a:xfrm>
             <a:off x="457200" y="1203480"/>
-            <a:ext cx="4015800" cy="2982960"/>
+            <a:ext cx="4015800" cy="2983320"/>
           </a:xfrm>
           <a:prstGeom prst="rect">
             <a:avLst/>
@@ -3506,7 +3506,7 @@
         <p:spPr>
           <a:xfrm>
             <a:off x="457200" y="1203480"/>
-            <a:ext cx="4015800" cy="2982960"/>
+            <a:ext cx="4015800" cy="2983320"/>
           </a:xfrm>
           <a:prstGeom prst="rect">
             <a:avLst/>
@@ -3536,7 +3536,7 @@
         <p:spPr>
           <a:xfrm>
             <a:off x="4674240" y="1203480"/>
-            <a:ext cx="4015800" cy="2982960"/>
+            <a:ext cx="4015800" cy="2983320"/>
           </a:xfrm>
           <a:prstGeom prst="rect">
             <a:avLst/>
@@ -3755,7 +3755,7 @@
         <p:spPr>
           <a:xfrm>
             <a:off x="4674240" y="1203480"/>
-            <a:ext cx="4015800" cy="2982960"/>
+            <a:ext cx="4015800" cy="2983320"/>
           </a:xfrm>
           <a:prstGeom prst="rect">
             <a:avLst/>
@@ -3868,7 +3868,7 @@
         <p:spPr>
           <a:xfrm>
             <a:off x="457200" y="1203480"/>
-            <a:ext cx="4015800" cy="2982960"/>
+            <a:ext cx="4015800" cy="2983320"/>
           </a:xfrm>
           <a:prstGeom prst="rect">
             <a:avLst/>
@@ -4129,8 +4129,8 @@
         </p:nvSpPr>
         <p:spPr>
           <a:xfrm>
-            <a:off x="311760" y="418320"/>
-            <a:ext cx="8519400" cy="624960"/>
+            <a:off x="457200" y="205200"/>
+            <a:ext cx="8229240" cy="858600"/>
           </a:xfrm>
           <a:prstGeom prst="rect">
             <a:avLst/>
@@ -4141,55 +4141,14 @@
             <a:noAutofit/>
           </a:bodyPr>
           <a:p>
-            <a:r>
-              <a:rPr b="0" lang="pt-BR" sz="1800" spc="-1" strike="noStrike">
-                <a:latin typeface="Arial"/>
-              </a:rPr>
-              <a:t>Clique </a:t>
-            </a:r>
-            <a:r>
-              <a:rPr b="0" lang="pt-BR" sz="1800" spc="-1" strike="noStrike">
-                <a:latin typeface="Arial"/>
-              </a:rPr>
-              <a:t>para </a:t>
-            </a:r>
-            <a:r>
-              <a:rPr b="0" lang="pt-BR" sz="1800" spc="-1" strike="noStrike">
-                <a:latin typeface="Arial"/>
-              </a:rPr>
-              <a:t>editar o </a:t>
-            </a:r>
-            <a:r>
-              <a:rPr b="0" lang="pt-BR" sz="1800" spc="-1" strike="noStrike">
-                <a:latin typeface="Arial"/>
-              </a:rPr>
-              <a:t>formato </a:t>
-            </a:r>
-            <a:r>
-              <a:rPr b="0" lang="pt-BR" sz="1800" spc="-1" strike="noStrike">
-                <a:latin typeface="Arial"/>
-              </a:rPr>
-              <a:t>do </a:t>
-            </a:r>
-            <a:r>
-              <a:rPr b="0" lang="pt-BR" sz="1800" spc="-1" strike="noStrike">
-                <a:latin typeface="Arial"/>
-              </a:rPr>
-              <a:t>texto </a:t>
-            </a:r>
-            <a:r>
-              <a:rPr b="0" lang="pt-BR" sz="1800" spc="-1" strike="noStrike">
-                <a:latin typeface="Arial"/>
-              </a:rPr>
-              <a:t>do </a:t>
-            </a:r>
-            <a:r>
-              <a:rPr b="0" lang="pt-BR" sz="1800" spc="-1" strike="noStrike">
-                <a:latin typeface="Arial"/>
-              </a:rPr>
-              <a:t>título</a:t>
-            </a:r>
-            <a:endParaRPr b="0" lang="pt-BR" sz="1800" spc="-1" strike="noStrike">
+            <a:pPr algn="ctr"/>
+            <a:r>
+              <a:rPr b="0" lang="pt-BR" sz="4400" spc="-1" strike="noStrike">
+                <a:latin typeface="Arial"/>
+              </a:rPr>
+              <a:t>Clique para editar o formato do texto do título</a:t>
+            </a:r>
+            <a:endParaRPr b="0" lang="pt-BR" sz="4400" spc="-1" strike="noStrike">
               <a:latin typeface="Arial"/>
             </a:endParaRPr>
           </a:p>
@@ -4207,8 +4166,8 @@
         </p:nvSpPr>
         <p:spPr>
           <a:xfrm>
-            <a:off x="311760" y="1152360"/>
-            <a:ext cx="8519400" cy="3415320"/>
+            <a:off x="457200" y="1203480"/>
+            <a:ext cx="8229240" cy="2983320"/>
           </a:xfrm>
           <a:prstGeom prst="rect">
             <a:avLst/>
@@ -4216,12 +4175,12 @@
         </p:spPr>
         <p:txBody>
           <a:bodyPr lIns="0" rIns="0" tIns="0" bIns="0">
-            <a:normAutofit/>
+            <a:normAutofit fontScale="80000"/>
           </a:bodyPr>
           <a:p>
             <a:pPr marL="432000" indent="-324000">
               <a:spcBef>
-                <a:spcPts val="1417"/>
+                <a:spcPts val="1414"/>
               </a:spcBef>
               <a:buClr>
                 <a:srgbClr val="000000"/>
@@ -4231,12 +4190,12 @@
               <a:buChar char=""/>
             </a:pPr>
             <a:r>
-              <a:rPr b="0" lang="pt-BR" sz="1800" spc="-1" strike="noStrike">
+              <a:rPr b="0" lang="pt-BR" sz="3200" spc="-1" strike="noStrike">
                 <a:latin typeface="Arial"/>
               </a:rPr>
               <a:t>Clique para editar o formato do texto da estrutura de tópicos</a:t>
             </a:r>
-            <a:endParaRPr b="0" lang="pt-BR" sz="1800" spc="-1" strike="noStrike">
+            <a:endParaRPr b="0" lang="pt-BR" sz="3200" spc="-1" strike="noStrike">
               <a:latin typeface="Arial"/>
             </a:endParaRPr>
           </a:p>
@@ -4253,12 +4212,12 @@
               <a:buChar char=""/>
             </a:pPr>
             <a:r>
-              <a:rPr b="0" lang="pt-BR" sz="1800" spc="-1" strike="noStrike">
+              <a:rPr b="0" lang="pt-BR" sz="2800" spc="-1" strike="noStrike">
                 <a:latin typeface="Arial"/>
               </a:rPr>
               <a:t>2.º nível da estrutura de tópicos</a:t>
             </a:r>
-            <a:endParaRPr b="0" lang="pt-BR" sz="1800" spc="-1" strike="noStrike">
+            <a:endParaRPr b="0" lang="pt-BR" sz="2800" spc="-1" strike="noStrike">
               <a:latin typeface="Arial"/>
             </a:endParaRPr>
           </a:p>
@@ -4275,12 +4234,12 @@
               <a:buChar char=""/>
             </a:pPr>
             <a:r>
-              <a:rPr b="0" lang="pt-BR" sz="1800" spc="-1" strike="noStrike">
+              <a:rPr b="0" lang="pt-BR" sz="2400" spc="-1" strike="noStrike">
                 <a:latin typeface="Arial"/>
               </a:rPr>
               <a:t>3.º nível da estrutura de tópicos</a:t>
             </a:r>
-            <a:endParaRPr b="0" lang="pt-BR" sz="1800" spc="-1" strike="noStrike">
+            <a:endParaRPr b="0" lang="pt-BR" sz="2400" spc="-1" strike="noStrike">
               <a:latin typeface="Arial"/>
             </a:endParaRPr>
           </a:p>
@@ -4297,12 +4256,12 @@
               <a:buChar char=""/>
             </a:pPr>
             <a:r>
-              <a:rPr b="0" lang="pt-BR" sz="1800" spc="-1" strike="noStrike">
+              <a:rPr b="0" lang="pt-BR" sz="2000" spc="-1" strike="noStrike">
                 <a:latin typeface="Arial"/>
               </a:rPr>
               <a:t>4.º nível da estrutura de tópicos</a:t>
             </a:r>
-            <a:endParaRPr b="0" lang="pt-BR" sz="1800" spc="-1" strike="noStrike">
+            <a:endParaRPr b="0" lang="pt-BR" sz="2000" spc="-1" strike="noStrike">
               <a:latin typeface="Arial"/>
             </a:endParaRPr>
           </a:p>
@@ -4319,12 +4278,12 @@
               <a:buChar char=""/>
             </a:pPr>
             <a:r>
-              <a:rPr b="0" lang="pt-BR" sz="1800" spc="-1" strike="noStrike">
+              <a:rPr b="0" lang="pt-BR" sz="2000" spc="-1" strike="noStrike">
                 <a:latin typeface="Arial"/>
               </a:rPr>
               <a:t>5.º nível da estrutura de tópicos</a:t>
             </a:r>
-            <a:endParaRPr b="0" lang="pt-BR" sz="1800" spc="-1" strike="noStrike">
+            <a:endParaRPr b="0" lang="pt-BR" sz="2000" spc="-1" strike="noStrike">
               <a:latin typeface="Arial"/>
             </a:endParaRPr>
           </a:p>
@@ -4341,12 +4300,12 @@
               <a:buChar char=""/>
             </a:pPr>
             <a:r>
-              <a:rPr b="0" lang="pt-BR" sz="1800" spc="-1" strike="noStrike">
+              <a:rPr b="0" lang="pt-BR" sz="2000" spc="-1" strike="noStrike">
                 <a:latin typeface="Arial"/>
               </a:rPr>
               <a:t>6.º nível da estrutura de tópicos</a:t>
             </a:r>
-            <a:endParaRPr b="0" lang="pt-BR" sz="1800" spc="-1" strike="noStrike">
+            <a:endParaRPr b="0" lang="pt-BR" sz="2000" spc="-1" strike="noStrike">
               <a:latin typeface="Arial"/>
             </a:endParaRPr>
           </a:p>
@@ -4363,12 +4322,12 @@
               <a:buChar char=""/>
             </a:pPr>
             <a:r>
-              <a:rPr b="0" lang="pt-BR" sz="1800" spc="-1" strike="noStrike">
+              <a:rPr b="0" lang="pt-BR" sz="2000" spc="-1" strike="noStrike">
                 <a:latin typeface="Arial"/>
               </a:rPr>
               <a:t>7.º nível da estrutura de tópicos</a:t>
             </a:r>
-            <a:endParaRPr b="0" lang="pt-BR" sz="1800" spc="-1" strike="noStrike">
+            <a:endParaRPr b="0" lang="pt-BR" sz="2000" spc="-1" strike="noStrike">
               <a:latin typeface="Arial"/>
             </a:endParaRPr>
           </a:p>
@@ -4430,8 +4389,8 @@
         </p:nvSpPr>
         <p:spPr>
           <a:xfrm>
-            <a:off x="311760" y="418320"/>
-            <a:ext cx="8519400" cy="624960"/>
+            <a:off x="457200" y="205200"/>
+            <a:ext cx="8229240" cy="858600"/>
           </a:xfrm>
           <a:prstGeom prst="rect">
             <a:avLst/>
@@ -4442,55 +4401,14 @@
             <a:noAutofit/>
           </a:bodyPr>
           <a:p>
-            <a:r>
-              <a:rPr b="0" lang="pt-BR" sz="1800" spc="-1" strike="noStrike">
-                <a:latin typeface="Arial"/>
-              </a:rPr>
-              <a:t>Clique </a:t>
-            </a:r>
-            <a:r>
-              <a:rPr b="0" lang="pt-BR" sz="1800" spc="-1" strike="noStrike">
-                <a:latin typeface="Arial"/>
-              </a:rPr>
-              <a:t>para </a:t>
-            </a:r>
-            <a:r>
-              <a:rPr b="0" lang="pt-BR" sz="1800" spc="-1" strike="noStrike">
-                <a:latin typeface="Arial"/>
-              </a:rPr>
-              <a:t>editar o </a:t>
-            </a:r>
-            <a:r>
-              <a:rPr b="0" lang="pt-BR" sz="1800" spc="-1" strike="noStrike">
-                <a:latin typeface="Arial"/>
-              </a:rPr>
-              <a:t>formato </a:t>
-            </a:r>
-            <a:r>
-              <a:rPr b="0" lang="pt-BR" sz="1800" spc="-1" strike="noStrike">
-                <a:latin typeface="Arial"/>
-              </a:rPr>
-              <a:t>do </a:t>
-            </a:r>
-            <a:r>
-              <a:rPr b="0" lang="pt-BR" sz="1800" spc="-1" strike="noStrike">
-                <a:latin typeface="Arial"/>
-              </a:rPr>
-              <a:t>texto </a:t>
-            </a:r>
-            <a:r>
-              <a:rPr b="0" lang="pt-BR" sz="1800" spc="-1" strike="noStrike">
-                <a:latin typeface="Arial"/>
-              </a:rPr>
-              <a:t>do </a:t>
-            </a:r>
-            <a:r>
-              <a:rPr b="0" lang="pt-BR" sz="1800" spc="-1" strike="noStrike">
-                <a:latin typeface="Arial"/>
-              </a:rPr>
-              <a:t>título</a:t>
-            </a:r>
-            <a:endParaRPr b="0" lang="pt-BR" sz="1800" spc="-1" strike="noStrike">
+            <a:pPr algn="ctr"/>
+            <a:r>
+              <a:rPr b="0" lang="pt-BR" sz="4400" spc="-1" strike="noStrike">
+                <a:latin typeface="Arial"/>
+              </a:rPr>
+              <a:t>Clique para editar o formato do texto do título</a:t>
+            </a:r>
+            <a:endParaRPr b="0" lang="pt-BR" sz="4400" spc="-1" strike="noStrike">
               <a:latin typeface="Arial"/>
             </a:endParaRPr>
           </a:p>
@@ -4508,8 +4426,8 @@
         </p:nvSpPr>
         <p:spPr>
           <a:xfrm>
-            <a:off x="311760" y="1152360"/>
-            <a:ext cx="8519400" cy="3415320"/>
+            <a:off x="457200" y="1203480"/>
+            <a:ext cx="8229240" cy="2983320"/>
           </a:xfrm>
           <a:prstGeom prst="rect">
             <a:avLst/>
@@ -4517,12 +4435,12 @@
         </p:spPr>
         <p:txBody>
           <a:bodyPr lIns="0" rIns="0" tIns="0" bIns="0">
-            <a:normAutofit/>
+            <a:normAutofit fontScale="88000"/>
           </a:bodyPr>
           <a:p>
             <a:pPr marL="432000" indent="-324000">
               <a:spcBef>
-                <a:spcPts val="1417"/>
+                <a:spcPts val="1414"/>
               </a:spcBef>
               <a:buClr>
                 <a:srgbClr val="000000"/>
@@ -4532,12 +4450,12 @@
               <a:buChar char=""/>
             </a:pPr>
             <a:r>
-              <a:rPr b="0" lang="pt-BR" sz="1800" spc="-1" strike="noStrike">
+              <a:rPr b="0" lang="pt-BR" sz="3200" spc="-1" strike="noStrike">
                 <a:latin typeface="Arial"/>
               </a:rPr>
               <a:t>Clique para editar o formato do texto da estrutura de tópicos</a:t>
             </a:r>
-            <a:endParaRPr b="0" lang="pt-BR" sz="1800" spc="-1" strike="noStrike">
+            <a:endParaRPr b="0" lang="pt-BR" sz="3200" spc="-1" strike="noStrike">
               <a:latin typeface="Arial"/>
             </a:endParaRPr>
           </a:p>
@@ -4554,12 +4472,12 @@
               <a:buChar char=""/>
             </a:pPr>
             <a:r>
-              <a:rPr b="0" lang="pt-BR" sz="1800" spc="-1" strike="noStrike">
+              <a:rPr b="0" lang="pt-BR" sz="2800" spc="-1" strike="noStrike">
                 <a:latin typeface="Arial"/>
               </a:rPr>
               <a:t>2.º nível da estrutura de tópicos</a:t>
             </a:r>
-            <a:endParaRPr b="0" lang="pt-BR" sz="1800" spc="-1" strike="noStrike">
+            <a:endParaRPr b="0" lang="pt-BR" sz="2800" spc="-1" strike="noStrike">
               <a:latin typeface="Arial"/>
             </a:endParaRPr>
           </a:p>
@@ -4576,12 +4494,12 @@
               <a:buChar char=""/>
             </a:pPr>
             <a:r>
-              <a:rPr b="0" lang="pt-BR" sz="1800" spc="-1" strike="noStrike">
+              <a:rPr b="0" lang="pt-BR" sz="2400" spc="-1" strike="noStrike">
                 <a:latin typeface="Arial"/>
               </a:rPr>
               <a:t>3.º nível da estrutura de tópicos</a:t>
             </a:r>
-            <a:endParaRPr b="0" lang="pt-BR" sz="1800" spc="-1" strike="noStrike">
+            <a:endParaRPr b="0" lang="pt-BR" sz="2400" spc="-1" strike="noStrike">
               <a:latin typeface="Arial"/>
             </a:endParaRPr>
           </a:p>
@@ -4598,12 +4516,12 @@
               <a:buChar char=""/>
             </a:pPr>
             <a:r>
-              <a:rPr b="0" lang="pt-BR" sz="1800" spc="-1" strike="noStrike">
+              <a:rPr b="0" lang="pt-BR" sz="2000" spc="-1" strike="noStrike">
                 <a:latin typeface="Arial"/>
               </a:rPr>
               <a:t>4.º nível da estrutura de tópicos</a:t>
             </a:r>
-            <a:endParaRPr b="0" lang="pt-BR" sz="1800" spc="-1" strike="noStrike">
+            <a:endParaRPr b="0" lang="pt-BR" sz="2000" spc="-1" strike="noStrike">
               <a:latin typeface="Arial"/>
             </a:endParaRPr>
           </a:p>
@@ -4620,12 +4538,12 @@
               <a:buChar char=""/>
             </a:pPr>
             <a:r>
-              <a:rPr b="0" lang="pt-BR" sz="1800" spc="-1" strike="noStrike">
+              <a:rPr b="0" lang="pt-BR" sz="2000" spc="-1" strike="noStrike">
                 <a:latin typeface="Arial"/>
               </a:rPr>
               <a:t>5.º nível da estrutura de tópicos</a:t>
             </a:r>
-            <a:endParaRPr b="0" lang="pt-BR" sz="1800" spc="-1" strike="noStrike">
+            <a:endParaRPr b="0" lang="pt-BR" sz="2000" spc="-1" strike="noStrike">
               <a:latin typeface="Arial"/>
             </a:endParaRPr>
           </a:p>
@@ -4642,12 +4560,12 @@
               <a:buChar char=""/>
             </a:pPr>
             <a:r>
-              <a:rPr b="0" lang="pt-BR" sz="1800" spc="-1" strike="noStrike">
+              <a:rPr b="0" lang="pt-BR" sz="2000" spc="-1" strike="noStrike">
                 <a:latin typeface="Arial"/>
               </a:rPr>
               <a:t>6.º nível da estrutura de tópicos</a:t>
             </a:r>
-            <a:endParaRPr b="0" lang="pt-BR" sz="1800" spc="-1" strike="noStrike">
+            <a:endParaRPr b="0" lang="pt-BR" sz="2000" spc="-1" strike="noStrike">
               <a:latin typeface="Arial"/>
             </a:endParaRPr>
           </a:p>
@@ -4664,12 +4582,12 @@
               <a:buChar char=""/>
             </a:pPr>
             <a:r>
-              <a:rPr b="0" lang="pt-BR" sz="1800" spc="-1" strike="noStrike">
+              <a:rPr b="0" lang="pt-BR" sz="2000" spc="-1" strike="noStrike">
                 <a:latin typeface="Arial"/>
               </a:rPr>
               <a:t>7.º nível da estrutura de tópicos</a:t>
             </a:r>
-            <a:endParaRPr b="0" lang="pt-BR" sz="1800" spc="-1" strike="noStrike">
+            <a:endParaRPr b="0" lang="pt-BR" sz="2000" spc="-1" strike="noStrike">
               <a:latin typeface="Arial"/>
             </a:endParaRPr>
           </a:p>
@@ -4748,103 +4666,7 @@
               <a:rPr b="0" lang="pt-BR" sz="4400" spc="-1" strike="noStrike">
                 <a:latin typeface="Arial"/>
               </a:rPr>
-              <a:t>Cli</a:t>
-            </a:r>
-            <a:r>
-              <a:rPr b="0" lang="pt-BR" sz="4400" spc="-1" strike="noStrike">
-                <a:latin typeface="Arial"/>
-              </a:rPr>
-              <a:t>qu</a:t>
-            </a:r>
-            <a:r>
-              <a:rPr b="0" lang="pt-BR" sz="4400" spc="-1" strike="noStrike">
-                <a:latin typeface="Arial"/>
-              </a:rPr>
-              <a:t>e </a:t>
-            </a:r>
-            <a:r>
-              <a:rPr b="0" lang="pt-BR" sz="4400" spc="-1" strike="noStrike">
-                <a:latin typeface="Arial"/>
-              </a:rPr>
-              <a:t>pa</a:t>
-            </a:r>
-            <a:r>
-              <a:rPr b="0" lang="pt-BR" sz="4400" spc="-1" strike="noStrike">
-                <a:latin typeface="Arial"/>
-              </a:rPr>
-              <a:t>ra </a:t>
-            </a:r>
-            <a:r>
-              <a:rPr b="0" lang="pt-BR" sz="4400" spc="-1" strike="noStrike">
-                <a:latin typeface="Arial"/>
-              </a:rPr>
-              <a:t>edi</a:t>
-            </a:r>
-            <a:r>
-              <a:rPr b="0" lang="pt-BR" sz="4400" spc="-1" strike="noStrike">
-                <a:latin typeface="Arial"/>
-              </a:rPr>
-              <a:t>tar </a:t>
-            </a:r>
-            <a:r>
-              <a:rPr b="0" lang="pt-BR" sz="4400" spc="-1" strike="noStrike">
-                <a:latin typeface="Arial"/>
-              </a:rPr>
-              <a:t>o </a:t>
-            </a:r>
-            <a:r>
-              <a:rPr b="0" lang="pt-BR" sz="4400" spc="-1" strike="noStrike">
-                <a:latin typeface="Arial"/>
-              </a:rPr>
-              <a:t>for</a:t>
-            </a:r>
-            <a:r>
-              <a:rPr b="0" lang="pt-BR" sz="4400" spc="-1" strike="noStrike">
-                <a:latin typeface="Arial"/>
-              </a:rPr>
-              <a:t>ma</a:t>
-            </a:r>
-            <a:r>
-              <a:rPr b="0" lang="pt-BR" sz="4400" spc="-1" strike="noStrike">
-                <a:latin typeface="Arial"/>
-              </a:rPr>
-              <a:t>to </a:t>
-            </a:r>
-            <a:r>
-              <a:rPr b="0" lang="pt-BR" sz="4400" spc="-1" strike="noStrike">
-                <a:latin typeface="Arial"/>
-              </a:rPr>
-              <a:t>do </a:t>
-            </a:r>
-            <a:r>
-              <a:rPr b="0" lang="pt-BR" sz="4400" spc="-1" strike="noStrike">
-                <a:latin typeface="Arial"/>
-              </a:rPr>
-              <a:t>tex</a:t>
-            </a:r>
-            <a:r>
-              <a:rPr b="0" lang="pt-BR" sz="4400" spc="-1" strike="noStrike">
-                <a:latin typeface="Arial"/>
-              </a:rPr>
-              <a:t>to </a:t>
-            </a:r>
-            <a:r>
-              <a:rPr b="0" lang="pt-BR" sz="4400" spc="-1" strike="noStrike">
-                <a:latin typeface="Arial"/>
-              </a:rPr>
-              <a:t>do </a:t>
-            </a:r>
-            <a:r>
-              <a:rPr b="0" lang="pt-BR" sz="4400" spc="-1" strike="noStrike">
-                <a:latin typeface="Arial"/>
-              </a:rPr>
-              <a:t>títu</a:t>
-            </a:r>
-            <a:r>
-              <a:rPr b="0" lang="pt-BR" sz="4400" spc="-1" strike="noStrike">
-                <a:latin typeface="Arial"/>
-              </a:rPr>
-              <a:t>lo</a:t>
+              <a:t>Clique para editar o formato do texto do título</a:t>
             </a:r>
             <a:endParaRPr b="0" lang="pt-BR" sz="4400" spc="-1" strike="noStrike">
               <a:latin typeface="Arial"/>
@@ -4865,7 +4687,7 @@
         <p:spPr>
           <a:xfrm>
             <a:off x="457200" y="1203480"/>
-            <a:ext cx="8229240" cy="2982960"/>
+            <a:ext cx="8229240" cy="2983320"/>
           </a:xfrm>
           <a:prstGeom prst="rect">
             <a:avLst/>
@@ -4878,7 +4700,7 @@
           <a:p>
             <a:pPr marL="432000" indent="-324000">
               <a:spcBef>
-                <a:spcPts val="1417"/>
+                <a:spcPts val="1414"/>
               </a:spcBef>
               <a:buClr>
                 <a:srgbClr val="000000"/>
@@ -5077,7 +4899,7 @@
         <p:spPr>
           <a:xfrm>
             <a:off x="311760" y="1150560"/>
-            <a:ext cx="8519400" cy="883800"/>
+            <a:ext cx="8519040" cy="883440"/>
           </a:xfrm>
           <a:prstGeom prst="rect">
             <a:avLst/>
@@ -5131,7 +4953,7 @@
         <p:spPr>
           <a:xfrm>
             <a:off x="311760" y="1953720"/>
-            <a:ext cx="8519400" cy="617040"/>
+            <a:ext cx="8519040" cy="616680"/>
           </a:xfrm>
           <a:prstGeom prst="rect">
             <a:avLst/>
@@ -5185,7 +5007,7 @@
         <p:spPr>
           <a:xfrm>
             <a:off x="311760" y="388440"/>
-            <a:ext cx="8519400" cy="883800"/>
+            <a:ext cx="8519040" cy="883440"/>
           </a:xfrm>
           <a:prstGeom prst="rect">
             <a:avLst/>
@@ -5239,7 +5061,7 @@
         <p:spPr>
           <a:xfrm>
             <a:off x="6538680" y="2487240"/>
-            <a:ext cx="2292480" cy="1897200"/>
+            <a:ext cx="2292120" cy="1897200"/>
           </a:xfrm>
           <a:prstGeom prst="rect">
             <a:avLst/>
@@ -5396,7 +5218,7 @@
         <p:spPr>
           <a:xfrm>
             <a:off x="3996000" y="897840"/>
-            <a:ext cx="503280" cy="725400"/>
+            <a:ext cx="502920" cy="725040"/>
           </a:xfrm>
           <a:prstGeom prst="rect">
             <a:avLst/>
@@ -5415,7 +5237,7 @@
         <p:spPr>
           <a:xfrm>
             <a:off x="4255200" y="1506960"/>
-            <a:ext cx="784080" cy="318600"/>
+            <a:ext cx="783720" cy="318240"/>
           </a:xfrm>
           <a:prstGeom prst="rect">
             <a:avLst/>
@@ -5465,8 +5287,8 @@
         </p:nvSpPr>
         <p:spPr>
           <a:xfrm>
-            <a:off x="4230000" y="3493440"/>
-            <a:ext cx="360" cy="639720"/>
+            <a:off x="4230000" y="3493800"/>
+            <a:ext cx="360" cy="639360"/>
           </a:xfrm>
           <a:prstGeom prst="bentConnector3">
             <a:avLst>
@@ -5496,8 +5318,8 @@
         </p:nvSpPr>
         <p:spPr>
           <a:xfrm>
-            <a:off x="3726360" y="4133520"/>
-            <a:ext cx="1006920" cy="359280"/>
+            <a:off x="3726360" y="4133880"/>
+            <a:ext cx="1006560" cy="358920"/>
           </a:xfrm>
           <a:prstGeom prst="roundRect">
             <a:avLst>
@@ -5557,8 +5379,8 @@
         </p:nvSpPr>
         <p:spPr>
           <a:xfrm>
-            <a:off x="3708360" y="3133440"/>
-            <a:ext cx="1042920" cy="359280"/>
+            <a:off x="3708360" y="3133800"/>
+            <a:ext cx="1042560" cy="358920"/>
           </a:xfrm>
           <a:prstGeom prst="roundRect">
             <a:avLst>
@@ -5618,8 +5440,8 @@
         </p:nvSpPr>
         <p:spPr>
           <a:xfrm>
-            <a:off x="4230000" y="2610360"/>
-            <a:ext cx="360" cy="522720"/>
+            <a:off x="4230000" y="2610720"/>
+            <a:ext cx="360" cy="522360"/>
           </a:xfrm>
           <a:prstGeom prst="bentConnector3">
             <a:avLst>
@@ -5649,8 +5471,8 @@
         </p:nvSpPr>
         <p:spPr>
           <a:xfrm>
-            <a:off x="2052360" y="4133520"/>
-            <a:ext cx="1006920" cy="359280"/>
+            <a:off x="2052360" y="4133880"/>
+            <a:ext cx="1006560" cy="358920"/>
           </a:xfrm>
           <a:prstGeom prst="roundRect">
             <a:avLst>
@@ -5710,8 +5532,8 @@
         </p:nvSpPr>
         <p:spPr>
           <a:xfrm flipH="1">
-            <a:off x="3059280" y="4313520"/>
-            <a:ext cx="666000" cy="360"/>
+            <a:off x="3058560" y="4313880"/>
+            <a:ext cx="665640" cy="360"/>
           </a:xfrm>
           <a:prstGeom prst="bentConnector3">
             <a:avLst>
@@ -5745,8 +5567,8 @@
         </p:blipFill>
         <p:spPr>
           <a:xfrm>
-            <a:off x="5528520" y="4091040"/>
-            <a:ext cx="455400" cy="444240"/>
+            <a:off x="5528520" y="4091400"/>
+            <a:ext cx="455040" cy="443880"/>
           </a:xfrm>
           <a:prstGeom prst="rect">
             <a:avLst/>
@@ -5764,8 +5586,8 @@
         </p:nvSpPr>
         <p:spPr>
           <a:xfrm>
-            <a:off x="4734000" y="4313520"/>
-            <a:ext cx="794160" cy="360"/>
+            <a:off x="4734000" y="4313880"/>
+            <a:ext cx="793800" cy="360"/>
           </a:xfrm>
           <a:prstGeom prst="bentConnector3">
             <a:avLst>
@@ -5796,7 +5618,7 @@
         <p:spPr>
           <a:xfrm>
             <a:off x="3600000" y="2142000"/>
-            <a:ext cx="1259640" cy="467640"/>
+            <a:ext cx="1259280" cy="467280"/>
           </a:xfrm>
           <a:prstGeom prst="diamond">
             <a:avLst/>
@@ -5855,7 +5677,7 @@
         <p:spPr>
           <a:xfrm flipH="1">
             <a:off x="4229280" y="1623960"/>
-            <a:ext cx="17640" cy="517680"/>
+            <a:ext cx="17280" cy="517320"/>
           </a:xfrm>
           <a:prstGeom prst="bentConnector3">
             <a:avLst>
@@ -5886,7 +5708,7 @@
         <p:spPr>
           <a:xfrm>
             <a:off x="312120" y="292680"/>
-            <a:ext cx="8519400" cy="571680"/>
+            <a:ext cx="8519040" cy="571320"/>
           </a:xfrm>
           <a:prstGeom prst="rect">
             <a:avLst/>
@@ -5969,8 +5791,8 @@
         </p:nvSpPr>
         <p:spPr>
           <a:xfrm>
-            <a:off x="4331160" y="3953520"/>
-            <a:ext cx="1078920" cy="503640"/>
+            <a:off x="4331160" y="3953880"/>
+            <a:ext cx="1078560" cy="503280"/>
           </a:xfrm>
           <a:prstGeom prst="roundRect">
             <a:avLst>
@@ -6030,8 +5852,8 @@
         </p:nvSpPr>
         <p:spPr>
           <a:xfrm>
-            <a:off x="4870800" y="3485520"/>
-            <a:ext cx="360" cy="467640"/>
+            <a:off x="4870800" y="3485880"/>
+            <a:ext cx="360" cy="467280"/>
           </a:xfrm>
           <a:prstGeom prst="bentConnector3">
             <a:avLst>
@@ -6066,7 +5888,7 @@
         <p:spPr>
           <a:xfrm>
             <a:off x="2664000" y="972000"/>
-            <a:ext cx="575280" cy="803880"/>
+            <a:ext cx="574920" cy="803520"/>
           </a:xfrm>
           <a:prstGeom prst="rect">
             <a:avLst/>
@@ -6085,7 +5907,7 @@
         <p:spPr>
           <a:xfrm>
             <a:off x="3060000" y="1650960"/>
-            <a:ext cx="784080" cy="318600"/>
+            <a:ext cx="783720" cy="318240"/>
           </a:xfrm>
           <a:prstGeom prst="rect">
             <a:avLst/>
@@ -6136,7 +5958,7 @@
         <p:spPr>
           <a:xfrm>
             <a:off x="4870800" y="2521440"/>
-            <a:ext cx="360" cy="603720"/>
+            <a:ext cx="360" cy="603360"/>
           </a:xfrm>
           <a:prstGeom prst="bentConnector3">
             <a:avLst>
@@ -6166,8 +5988,8 @@
         </p:nvSpPr>
         <p:spPr>
           <a:xfrm>
-            <a:off x="4367160" y="3125520"/>
-            <a:ext cx="1006920" cy="359280"/>
+            <a:off x="4367160" y="3125880"/>
+            <a:ext cx="1006560" cy="358920"/>
           </a:xfrm>
           <a:prstGeom prst="roundRect">
             <a:avLst>
@@ -6228,7 +6050,7 @@
         <p:spPr>
           <a:xfrm>
             <a:off x="4349160" y="2161440"/>
-            <a:ext cx="1042920" cy="359280"/>
+            <a:ext cx="1042560" cy="358920"/>
           </a:xfrm>
           <a:prstGeom prst="roundRect">
             <a:avLst>
@@ -6289,7 +6111,7 @@
         <p:spPr>
           <a:xfrm>
             <a:off x="4870800" y="1608480"/>
-            <a:ext cx="360" cy="552600"/>
+            <a:ext cx="360" cy="552240"/>
           </a:xfrm>
           <a:prstGeom prst="bentConnector3">
             <a:avLst>
@@ -6319,8 +6141,8 @@
         </p:nvSpPr>
         <p:spPr>
           <a:xfrm>
-            <a:off x="2693160" y="3125520"/>
-            <a:ext cx="1006920" cy="359280"/>
+            <a:off x="2693160" y="3125880"/>
+            <a:ext cx="1006560" cy="358920"/>
           </a:xfrm>
           <a:prstGeom prst="roundRect">
             <a:avLst>
@@ -6380,8 +6202,8 @@
         </p:nvSpPr>
         <p:spPr>
           <a:xfrm flipH="1">
-            <a:off x="3700080" y="3305520"/>
-            <a:ext cx="666000" cy="360"/>
+            <a:off x="3699360" y="3305880"/>
+            <a:ext cx="665640" cy="360"/>
           </a:xfrm>
           <a:prstGeom prst="bentConnector3">
             <a:avLst>
@@ -6415,8 +6237,8 @@
         </p:blipFill>
         <p:spPr>
           <a:xfrm>
-            <a:off x="6169320" y="3083040"/>
-            <a:ext cx="455400" cy="444240"/>
+            <a:off x="6169320" y="3083400"/>
+            <a:ext cx="455040" cy="443880"/>
           </a:xfrm>
           <a:prstGeom prst="rect">
             <a:avLst/>
@@ -6434,8 +6256,8 @@
         </p:nvSpPr>
         <p:spPr>
           <a:xfrm>
-            <a:off x="5374800" y="3305520"/>
-            <a:ext cx="794160" cy="360"/>
+            <a:off x="5374800" y="3305880"/>
+            <a:ext cx="793800" cy="360"/>
           </a:xfrm>
           <a:prstGeom prst="bentConnector3">
             <a:avLst>
@@ -6466,7 +6288,7 @@
         <p:spPr>
           <a:xfrm>
             <a:off x="4240800" y="1140120"/>
-            <a:ext cx="1259640" cy="467640"/>
+            <a:ext cx="1259280" cy="467280"/>
           </a:xfrm>
           <a:prstGeom prst="diamond">
             <a:avLst/>
@@ -6525,7 +6347,7 @@
         <p:spPr>
           <a:xfrm>
             <a:off x="3240000" y="1374120"/>
-            <a:ext cx="1000440" cy="360"/>
+            <a:ext cx="1000080" cy="360"/>
           </a:xfrm>
           <a:prstGeom prst="bentConnector3">
             <a:avLst>
@@ -6556,7 +6378,7 @@
         <p:spPr>
           <a:xfrm>
             <a:off x="312120" y="292680"/>
-            <a:ext cx="8519400" cy="571680"/>
+            <a:ext cx="8519040" cy="571320"/>
           </a:xfrm>
           <a:prstGeom prst="rect">
             <a:avLst/>
@@ -6617,6 +6439,13 @@
 <file path=ppt/slides/slide12.xml><?xml version="1.0" encoding="utf-8"?>
 <p:sld xmlns:a="http://schemas.openxmlformats.org/drawingml/2006/main" xmlns:p="http://schemas.openxmlformats.org/presentationml/2006/main" xmlns:r="http://schemas.openxmlformats.org/officeDocument/2006/relationships" xmlns:p14="http://schemas.microsoft.com/office/powerpoint/2010/main" xmlns:p15="http://schemas.microsoft.com/office/powerpoint/2012/main" xmlns:mc="http://schemas.openxmlformats.org/markup-compatibility/2006" show="0">
   <p:cSld>
+    <p:bg>
+      <p:bgPr>
+        <a:solidFill>
+          <a:srgbClr val="000000"/>
+        </a:solidFill>
+      </p:bgPr>
+    </p:bg>
     <p:spTree>
       <p:nvGrpSpPr>
         <p:cNvPr id="1" name=""/>
@@ -6640,7 +6469,7 @@
         <p:spPr>
           <a:xfrm>
             <a:off x="311760" y="292680"/>
-            <a:ext cx="8519400" cy="571680"/>
+            <a:ext cx="8519040" cy="571320"/>
           </a:xfrm>
           <a:prstGeom prst="rect">
             <a:avLst/>
@@ -6670,16 +6499,19 @@
               </a:tabLst>
             </a:pPr>
             <a:r>
-              <a:rPr b="0" lang="en-US" sz="2000" spc="-1" strike="noStrike">
+              <a:rPr b="0" lang="en-US" sz="1800" spc="-1" strike="noStrike">
                 <a:solidFill>
-                  <a:srgbClr val="000000"/>
+                  <a:srgbClr val="ffffff"/>
                 </a:solidFill>
                 <a:latin typeface="Arial"/>
                 <a:ea typeface="Arial"/>
               </a:rPr>
               <a:t>Fluxo das Telas - Geral</a:t>
             </a:r>
-            <a:endParaRPr b="0" lang="pt-BR" sz="2000" spc="-1" strike="noStrike">
+            <a:endParaRPr b="0" lang="pt-BR" sz="1800" spc="-1" strike="noStrike">
+              <a:solidFill>
+                <a:srgbClr val="ffffff"/>
+              </a:solidFill>
               <a:latin typeface="Arial"/>
             </a:endParaRPr>
           </a:p>
@@ -6698,7 +6530,7 @@
         <p:spPr>
           <a:xfrm>
             <a:off x="1224000" y="936000"/>
-            <a:ext cx="503280" cy="725400"/>
+            <a:ext cx="502920" cy="725040"/>
           </a:xfrm>
           <a:prstGeom prst="rect">
             <a:avLst/>
@@ -6715,16 +6547,21 @@
           <p:nvPr/>
         </p:nvSpPr>
         <p:spPr>
-          <a:xfrm>
-            <a:off x="2779200" y="2586960"/>
-            <a:ext cx="748080" cy="256320"/>
-          </a:xfrm>
-          <a:prstGeom prst="rect">
-            <a:avLst/>
+          <a:xfrm flipH="1">
+            <a:off x="1607760" y="4200840"/>
+            <a:ext cx="712800" cy="360"/>
+          </a:xfrm>
+          <a:prstGeom prst="bentConnector3">
+            <a:avLst>
+              <a:gd name="adj1" fmla="val 50000"/>
+            </a:avLst>
           </a:prstGeom>
           <a:noFill/>
           <a:ln>
-            <a:noFill/>
+            <a:solidFill>
+              <a:srgbClr val="ffffff"/>
+            </a:solidFill>
+            <a:tailEnd len="med" type="triangle" w="med"/>
           </a:ln>
         </p:spPr>
         <p:style>
@@ -6733,31 +6570,6 @@
           <a:effectRef idx="0"/>
           <a:fontRef idx="minor"/>
         </p:style>
-        <p:txBody>
-          <a:bodyPr lIns="90000" rIns="90000" tIns="45000" bIns="45000">
-            <a:noAutofit/>
-          </a:bodyPr>
-          <a:p>
-            <a:pPr>
-              <a:lnSpc>
-                <a:spcPct val="100000"/>
-              </a:lnSpc>
-            </a:pPr>
-            <a:r>
-              <a:rPr b="0" lang="en-US" sz="800" spc="-1" strike="noStrike">
-                <a:solidFill>
-                  <a:srgbClr val="000000"/>
-                </a:solidFill>
-                <a:latin typeface="Arial"/>
-                <a:ea typeface="Arial"/>
-              </a:rPr>
-              <a:t>Cadastrador</a:t>
-            </a:r>
-            <a:endParaRPr b="0" lang="pt-BR" sz="800" spc="-1" strike="noStrike">
-              <a:latin typeface="Arial"/>
-            </a:endParaRPr>
-          </a:p>
-        </p:txBody>
       </p:sp>
       <p:sp>
         <p:nvSpPr>
@@ -6767,121 +6579,8 @@
         </p:nvSpPr>
         <p:spPr>
           <a:xfrm>
-            <a:off x="1188000" y="1620000"/>
-            <a:ext cx="604080" cy="256320"/>
-          </a:xfrm>
-          <a:prstGeom prst="rect">
-            <a:avLst/>
-          </a:prstGeom>
-          <a:noFill/>
-          <a:ln>
-            <a:noFill/>
-          </a:ln>
-        </p:spPr>
-        <p:style>
-          <a:lnRef idx="0"/>
-          <a:fillRef idx="0"/>
-          <a:effectRef idx="0"/>
-          <a:fontRef idx="minor"/>
-        </p:style>
-        <p:txBody>
-          <a:bodyPr lIns="90000" rIns="90000" tIns="45000" bIns="45000">
-            <a:noAutofit/>
-          </a:bodyPr>
-          <a:p>
-            <a:pPr>
-              <a:lnSpc>
-                <a:spcPct val="100000"/>
-              </a:lnSpc>
-            </a:pPr>
-            <a:r>
-              <a:rPr b="0" lang="en-US" sz="800" spc="-1" strike="noStrike">
-                <a:solidFill>
-                  <a:srgbClr val="000000"/>
-                </a:solidFill>
-                <a:latin typeface="Arial"/>
-                <a:ea typeface="Arial"/>
-              </a:rPr>
-              <a:t>Visitante</a:t>
-            </a:r>
-            <a:endParaRPr b="0" lang="pt-BR" sz="800" spc="-1" strike="noStrike">
-              <a:latin typeface="Arial"/>
-            </a:endParaRPr>
-          </a:p>
-        </p:txBody>
-      </p:sp>
-      <p:sp>
-        <p:nvSpPr>
-          <p:cNvPr id="180" name="CustomShape 4"/>
-          <p:cNvSpPr/>
-          <p:nvPr/>
-        </p:nvSpPr>
-        <p:spPr>
-          <a:xfrm>
-            <a:off x="3329640" y="4200480"/>
-            <a:ext cx="720000" cy="360"/>
-          </a:xfrm>
-          <a:prstGeom prst="bentConnector3">
-            <a:avLst>
-              <a:gd name="adj1" fmla="val 50000"/>
-            </a:avLst>
-          </a:prstGeom>
-          <a:noFill/>
-          <a:ln>
-            <a:solidFill>
-              <a:srgbClr val="000000"/>
-            </a:solidFill>
-            <a:tailEnd len="med" type="triangle" w="med"/>
-          </a:ln>
-        </p:spPr>
-        <p:style>
-          <a:lnRef idx="0"/>
-          <a:fillRef idx="0"/>
-          <a:effectRef idx="0"/>
-          <a:fontRef idx="minor"/>
-        </p:style>
-      </p:sp>
-      <p:sp>
-        <p:nvSpPr>
-          <p:cNvPr id="181" name="CustomShape 5"/>
-          <p:cNvSpPr/>
-          <p:nvPr/>
-        </p:nvSpPr>
-        <p:spPr>
-          <a:xfrm flipH="1">
-            <a:off x="1607760" y="4200480"/>
-            <a:ext cx="713160" cy="360"/>
-          </a:xfrm>
-          <a:prstGeom prst="bentConnector3">
-            <a:avLst>
-              <a:gd name="adj1" fmla="val 50000"/>
-            </a:avLst>
-          </a:prstGeom>
-          <a:noFill/>
-          <a:ln>
-            <a:solidFill>
-              <a:srgbClr val="000000"/>
-            </a:solidFill>
-            <a:tailEnd len="med" type="triangle" w="med"/>
-          </a:ln>
-        </p:spPr>
-        <p:style>
-          <a:lnRef idx="0"/>
-          <a:fillRef idx="0"/>
-          <a:effectRef idx="0"/>
-          <a:fontRef idx="minor"/>
-        </p:style>
-      </p:sp>
-      <p:sp>
-        <p:nvSpPr>
-          <p:cNvPr id="182" name="CustomShape 6"/>
-          <p:cNvSpPr/>
-          <p:nvPr/>
-        </p:nvSpPr>
-        <p:spPr>
-          <a:xfrm>
-            <a:off x="5706360" y="2088000"/>
-            <a:ext cx="1006920" cy="359280"/>
+            <a:off x="5706360" y="1119240"/>
+            <a:ext cx="1006560" cy="358920"/>
           </a:xfrm>
           <a:prstGeom prst="roundRect">
             <a:avLst>
@@ -6935,14 +6634,14 @@
       </p:sp>
       <p:sp>
         <p:nvSpPr>
-          <p:cNvPr id="183" name="CustomShape 7"/>
+          <p:cNvPr id="180" name="CustomShape 4"/>
           <p:cNvSpPr/>
           <p:nvPr/>
         </p:nvSpPr>
         <p:spPr>
           <a:xfrm>
-            <a:off x="2825640" y="3402360"/>
-            <a:ext cx="360" cy="581760"/>
+            <a:off x="2825640" y="3402720"/>
+            <a:ext cx="360" cy="581400"/>
           </a:xfrm>
           <a:prstGeom prst="bentConnector3">
             <a:avLst>
@@ -6952,7 +6651,7 @@
           <a:noFill/>
           <a:ln>
             <a:solidFill>
-              <a:srgbClr val="000000"/>
+              <a:srgbClr val="ffffff"/>
             </a:solidFill>
             <a:tailEnd len="med" type="triangle" w="med"/>
           </a:ln>
@@ -6966,45 +6665,14 @@
       </p:sp>
       <p:sp>
         <p:nvSpPr>
-          <p:cNvPr id="184" name="CustomShape 8"/>
+          <p:cNvPr id="181" name="CustomShape 5"/>
           <p:cNvSpPr/>
           <p:nvPr/>
         </p:nvSpPr>
         <p:spPr>
-          <a:xfrm flipH="1" flipV="1">
-            <a:off x="4552200" y="2051280"/>
-            <a:ext cx="1656000" cy="1932120"/>
-          </a:xfrm>
-          <a:prstGeom prst="bentConnector3">
-            <a:avLst>
-              <a:gd name="adj1" fmla="val 50000"/>
-            </a:avLst>
-          </a:prstGeom>
-          <a:noFill/>
-          <a:ln>
-            <a:solidFill>
-              <a:srgbClr val="000000"/>
-            </a:solidFill>
-            <a:tailEnd len="med" type="triangle" w="med"/>
-          </a:ln>
-        </p:spPr>
-        <p:style>
-          <a:lnRef idx="0"/>
-          <a:fillRef idx="0"/>
-          <a:effectRef idx="0"/>
-          <a:fontRef idx="minor"/>
-        </p:style>
-      </p:sp>
-      <p:sp>
-        <p:nvSpPr>
-          <p:cNvPr id="185" name="CustomShape 9"/>
-          <p:cNvSpPr/>
-          <p:nvPr/>
-        </p:nvSpPr>
-        <p:spPr>
-          <a:xfrm>
-            <a:off x="2322000" y="3984480"/>
-            <a:ext cx="1006920" cy="431280"/>
+          <a:xfrm>
+            <a:off x="2322000" y="3984840"/>
+            <a:ext cx="1006560" cy="430920"/>
           </a:xfrm>
           <a:prstGeom prst="roundRect">
             <a:avLst>
@@ -7058,14 +6726,14 @@
       </p:sp>
       <p:sp>
         <p:nvSpPr>
-          <p:cNvPr id="186" name="CustomShape 10"/>
+          <p:cNvPr id="182" name="CustomShape 6"/>
           <p:cNvSpPr/>
           <p:nvPr/>
         </p:nvSpPr>
         <p:spPr>
           <a:xfrm>
-            <a:off x="4032000" y="1512000"/>
-            <a:ext cx="1042920" cy="539280"/>
+            <a:off x="4032000" y="1029240"/>
+            <a:ext cx="1042560" cy="538920"/>
           </a:xfrm>
           <a:prstGeom prst="roundRect">
             <a:avLst>
@@ -7119,76 +6787,14 @@
       </p:sp>
       <p:sp>
         <p:nvSpPr>
-          <p:cNvPr id="187" name="CustomShape 11"/>
+          <p:cNvPr id="183" name="CustomShape 7"/>
           <p:cNvSpPr/>
           <p:nvPr/>
         </p:nvSpPr>
         <p:spPr>
           <a:xfrm>
-            <a:off x="3368520" y="1298880"/>
-            <a:ext cx="663120" cy="482760"/>
-          </a:xfrm>
-          <a:prstGeom prst="bentConnector3">
-            <a:avLst>
-              <a:gd name="adj1" fmla="val 50000"/>
-            </a:avLst>
-          </a:prstGeom>
-          <a:noFill/>
-          <a:ln>
-            <a:solidFill>
-              <a:srgbClr val="000000"/>
-            </a:solidFill>
-            <a:tailEnd len="med" type="triangle" w="med"/>
-          </a:ln>
-        </p:spPr>
-        <p:style>
-          <a:lnRef idx="0"/>
-          <a:fillRef idx="0"/>
-          <a:effectRef idx="0"/>
-          <a:fontRef idx="minor"/>
-        </p:style>
-      </p:sp>
-      <p:sp>
-        <p:nvSpPr>
-          <p:cNvPr id="188" name="CustomShape 12"/>
-          <p:cNvSpPr/>
-          <p:nvPr/>
-        </p:nvSpPr>
-        <p:spPr>
-          <a:xfrm>
-            <a:off x="5075640" y="1782000"/>
-            <a:ext cx="630360" cy="485640"/>
-          </a:xfrm>
-          <a:prstGeom prst="bentConnector3">
-            <a:avLst>
-              <a:gd name="adj1" fmla="val 50000"/>
-            </a:avLst>
-          </a:prstGeom>
-          <a:noFill/>
-          <a:ln>
-            <a:solidFill>
-              <a:srgbClr val="000000"/>
-            </a:solidFill>
-            <a:tailEnd len="med" type="triangle" w="med"/>
-          </a:ln>
-        </p:spPr>
-        <p:style>
-          <a:lnRef idx="0"/>
-          <a:fillRef idx="0"/>
-          <a:effectRef idx="0"/>
-          <a:fontRef idx="minor"/>
-        </p:style>
-      </p:sp>
-      <p:sp>
-        <p:nvSpPr>
-          <p:cNvPr id="189" name="CustomShape 13"/>
-          <p:cNvSpPr/>
-          <p:nvPr/>
-        </p:nvSpPr>
-        <p:spPr>
-          <a:xfrm>
-            <a:off x="5562360" y="3984480"/>
-            <a:ext cx="1294920" cy="431280"/>
+            <a:off x="5814360" y="3012840"/>
+            <a:ext cx="1294560" cy="430920"/>
           </a:xfrm>
           <a:prstGeom prst="diamond">
             <a:avLst/>
@@ -7263,14 +6869,14 @@
       </p:sp>
       <p:sp>
         <p:nvSpPr>
-          <p:cNvPr id="190" name="CustomShape 14"/>
+          <p:cNvPr id="184" name="CustomShape 8"/>
           <p:cNvSpPr/>
           <p:nvPr/>
         </p:nvSpPr>
         <p:spPr>
           <a:xfrm>
-            <a:off x="5057640" y="4200480"/>
-            <a:ext cx="504360" cy="360"/>
+            <a:off x="2825640" y="2520000"/>
+            <a:ext cx="360" cy="521640"/>
           </a:xfrm>
           <a:prstGeom prst="bentConnector3">
             <a:avLst>
@@ -7280,7 +6886,7 @@
           <a:noFill/>
           <a:ln>
             <a:solidFill>
-              <a:srgbClr val="000000"/>
+              <a:srgbClr val="ffffff"/>
             </a:solidFill>
             <a:tailEnd len="med" type="triangle" w="med"/>
           </a:ln>
@@ -7294,232 +6900,14 @@
       </p:sp>
       <p:sp>
         <p:nvSpPr>
-          <p:cNvPr id="191" name="CustomShape 15"/>
+          <p:cNvPr id="185" name="CustomShape 9"/>
           <p:cNvSpPr/>
           <p:nvPr/>
         </p:nvSpPr>
         <p:spPr>
           <a:xfrm>
-            <a:off x="6912000" y="3996000"/>
-            <a:ext cx="388080" cy="256320"/>
-          </a:xfrm>
-          <a:prstGeom prst="rect">
-            <a:avLst/>
-          </a:prstGeom>
-          <a:noFill/>
-          <a:ln>
-            <a:noFill/>
-          </a:ln>
-        </p:spPr>
-        <p:style>
-          <a:lnRef idx="0"/>
-          <a:fillRef idx="0"/>
-          <a:effectRef idx="0"/>
-          <a:fontRef idx="minor"/>
-        </p:style>
-        <p:txBody>
-          <a:bodyPr lIns="90000" rIns="90000" tIns="45000" bIns="45000">
-            <a:noAutofit/>
-          </a:bodyPr>
-          <a:p>
-            <a:pPr>
-              <a:lnSpc>
-                <a:spcPct val="100000"/>
-              </a:lnSpc>
-            </a:pPr>
-            <a:r>
-              <a:rPr b="0" lang="en-US" sz="800" spc="-1" strike="noStrike">
-                <a:solidFill>
-                  <a:srgbClr val="000000"/>
-                </a:solidFill>
-                <a:latin typeface="Arial"/>
-                <a:ea typeface="Arial"/>
-              </a:rPr>
-              <a:t>Não</a:t>
-            </a:r>
-            <a:endParaRPr b="0" lang="pt-BR" sz="800" spc="-1" strike="noStrike">
-              <a:latin typeface="Arial"/>
-            </a:endParaRPr>
-          </a:p>
-        </p:txBody>
-      </p:sp>
-      <p:sp>
-        <p:nvSpPr>
-          <p:cNvPr id="192" name="CustomShape 16"/>
-          <p:cNvSpPr/>
-          <p:nvPr/>
-        </p:nvSpPr>
-        <p:spPr>
-          <a:xfrm>
-            <a:off x="5874840" y="3744000"/>
-            <a:ext cx="388080" cy="256320"/>
-          </a:xfrm>
-          <a:prstGeom prst="rect">
-            <a:avLst/>
-          </a:prstGeom>
-          <a:noFill/>
-          <a:ln>
-            <a:noFill/>
-          </a:ln>
-        </p:spPr>
-        <p:style>
-          <a:lnRef idx="0"/>
-          <a:fillRef idx="0"/>
-          <a:effectRef idx="0"/>
-          <a:fontRef idx="minor"/>
-        </p:style>
-        <p:txBody>
-          <a:bodyPr lIns="90000" rIns="90000" tIns="45000" bIns="45000">
-            <a:noAutofit/>
-          </a:bodyPr>
-          <a:p>
-            <a:pPr>
-              <a:lnSpc>
-                <a:spcPct val="100000"/>
-              </a:lnSpc>
-            </a:pPr>
-            <a:r>
-              <a:rPr b="0" lang="en-US" sz="800" spc="-1" strike="noStrike">
-                <a:solidFill>
-                  <a:srgbClr val="000000"/>
-                </a:solidFill>
-                <a:latin typeface="Arial"/>
-                <a:ea typeface="Arial"/>
-              </a:rPr>
-              <a:t>Sim</a:t>
-            </a:r>
-            <a:endParaRPr b="0" lang="pt-BR" sz="800" spc="-1" strike="noStrike">
-              <a:latin typeface="Arial"/>
-            </a:endParaRPr>
-          </a:p>
-        </p:txBody>
-      </p:sp>
-      <p:pic>
-        <p:nvPicPr>
-          <p:cNvPr id="193" name="" descr=""/>
-          <p:cNvPicPr/>
-          <p:nvPr/>
-        </p:nvPicPr>
-        <p:blipFill>
-          <a:blip r:embed="rId2"/>
-          <a:stretch/>
-        </p:blipFill>
-        <p:spPr>
-          <a:xfrm>
-            <a:off x="7535880" y="3978000"/>
-            <a:ext cx="455400" cy="444240"/>
-          </a:xfrm>
-          <a:prstGeom prst="rect">
-            <a:avLst/>
-          </a:prstGeom>
-          <a:ln>
-            <a:noFill/>
-          </a:ln>
-        </p:spPr>
-      </p:pic>
-      <p:sp>
-        <p:nvSpPr>
-          <p:cNvPr id="194" name="CustomShape 17"/>
-          <p:cNvSpPr/>
-          <p:nvPr/>
-        </p:nvSpPr>
-        <p:spPr>
-          <a:xfrm>
-            <a:off x="6858000" y="4200480"/>
-            <a:ext cx="677520" cy="360"/>
-          </a:xfrm>
-          <a:prstGeom prst="bentConnector3">
-            <a:avLst>
-              <a:gd name="adj1" fmla="val 50000"/>
-            </a:avLst>
-          </a:prstGeom>
-          <a:noFill/>
-          <a:ln>
-            <a:solidFill>
-              <a:srgbClr val="000000"/>
-            </a:solidFill>
-            <a:tailEnd len="med" type="triangle" w="med"/>
-          </a:ln>
-        </p:spPr>
-        <p:style>
-          <a:lnRef idx="0"/>
-          <a:fillRef idx="0"/>
-          <a:effectRef idx="0"/>
-          <a:fontRef idx="minor"/>
-        </p:style>
-      </p:sp>
-      <p:sp>
-        <p:nvSpPr>
-          <p:cNvPr id="195" name="CustomShape 18"/>
-          <p:cNvSpPr/>
-          <p:nvPr/>
-        </p:nvSpPr>
-        <p:spPr>
-          <a:xfrm>
-            <a:off x="1728000" y="1298880"/>
-            <a:ext cx="554400" cy="360"/>
-          </a:xfrm>
-          <a:prstGeom prst="bentConnector3">
-            <a:avLst>
-              <a:gd name="adj1" fmla="val 50000"/>
-            </a:avLst>
-          </a:prstGeom>
-          <a:noFill/>
-          <a:ln>
-            <a:solidFill>
-              <a:srgbClr val="000000"/>
-            </a:solidFill>
-            <a:tailEnd len="med" type="triangle" w="med"/>
-          </a:ln>
-        </p:spPr>
-        <p:style>
-          <a:lnRef idx="0"/>
-          <a:fillRef idx="0"/>
-          <a:effectRef idx="0"/>
-          <a:fontRef idx="minor"/>
-        </p:style>
-      </p:sp>
-      <p:sp>
-        <p:nvSpPr>
-          <p:cNvPr id="196" name="CustomShape 19"/>
-          <p:cNvSpPr/>
-          <p:nvPr/>
-        </p:nvSpPr>
-        <p:spPr>
-          <a:xfrm>
-            <a:off x="2825640" y="2520000"/>
-            <a:ext cx="360" cy="522000"/>
-          </a:xfrm>
-          <a:prstGeom prst="bentConnector3">
-            <a:avLst>
-              <a:gd name="adj1" fmla="val 50000"/>
-            </a:avLst>
-          </a:prstGeom>
-          <a:noFill/>
-          <a:ln>
-            <a:solidFill>
-              <a:srgbClr val="000000"/>
-            </a:solidFill>
-            <a:tailEnd len="med" type="triangle" w="med"/>
-          </a:ln>
-        </p:spPr>
-        <p:style>
-          <a:lnRef idx="0"/>
-          <a:fillRef idx="0"/>
-          <a:effectRef idx="0"/>
-          <a:fontRef idx="minor"/>
-        </p:style>
-      </p:sp>
-      <p:sp>
-        <p:nvSpPr>
-          <p:cNvPr id="197" name="CustomShape 20"/>
-          <p:cNvSpPr/>
-          <p:nvPr/>
-        </p:nvSpPr>
-        <p:spPr>
-          <a:xfrm>
             <a:off x="2195640" y="2051640"/>
-            <a:ext cx="1259640" cy="467640"/>
+            <a:ext cx="1259280" cy="467280"/>
           </a:xfrm>
           <a:prstGeom prst="diamond">
             <a:avLst/>
@@ -7571,18 +6959,18 @@
       </p:sp>
       <p:pic>
         <p:nvPicPr>
-          <p:cNvPr id="198" name="" descr=""/>
+          <p:cNvPr id="186" name="" descr=""/>
           <p:cNvPicPr/>
           <p:nvPr/>
         </p:nvPicPr>
         <p:blipFill>
-          <a:blip r:embed="rId3"/>
+          <a:blip r:embed="rId2"/>
           <a:stretch/>
         </p:blipFill>
         <p:spPr>
           <a:xfrm>
-            <a:off x="6282000" y="3168000"/>
-            <a:ext cx="575280" cy="803880"/>
+            <a:off x="7144920" y="2736000"/>
+            <a:ext cx="574920" cy="803520"/>
           </a:xfrm>
           <a:prstGeom prst="rect">
             <a:avLst/>
@@ -7594,14 +6982,14 @@
       </p:pic>
       <p:sp>
         <p:nvSpPr>
-          <p:cNvPr id="199" name="CustomShape 21"/>
+          <p:cNvPr id="187" name="CustomShape 10"/>
           <p:cNvSpPr/>
           <p:nvPr/>
         </p:nvSpPr>
         <p:spPr>
           <a:xfrm>
-            <a:off x="2282760" y="1049760"/>
-            <a:ext cx="1085040" cy="497520"/>
+            <a:off x="2282760" y="1050120"/>
+            <a:ext cx="1084680" cy="497160"/>
           </a:xfrm>
           <a:prstGeom prst="roundRect">
             <a:avLst>
@@ -7655,14 +7043,14 @@
       </p:sp>
       <p:sp>
         <p:nvSpPr>
-          <p:cNvPr id="200" name="CustomShape 22"/>
+          <p:cNvPr id="188" name="CustomShape 11"/>
           <p:cNvSpPr/>
           <p:nvPr/>
         </p:nvSpPr>
         <p:spPr>
           <a:xfrm>
-            <a:off x="6703200" y="3312000"/>
-            <a:ext cx="532080" cy="318600"/>
+            <a:off x="6703200" y="3312360"/>
+            <a:ext cx="531720" cy="318240"/>
           </a:xfrm>
           <a:prstGeom prst="rect">
             <a:avLst/>
@@ -7706,14 +7094,14 @@
       </p:sp>
       <p:sp>
         <p:nvSpPr>
-          <p:cNvPr id="201" name="CustomShape 23"/>
+          <p:cNvPr id="189" name="CustomShape 12"/>
           <p:cNvSpPr/>
           <p:nvPr/>
         </p:nvSpPr>
         <p:spPr>
           <a:xfrm>
             <a:off x="2825640" y="1548000"/>
-            <a:ext cx="360" cy="503280"/>
+            <a:ext cx="360" cy="502920"/>
           </a:xfrm>
           <a:prstGeom prst="bentConnector3">
             <a:avLst>
@@ -7723,7 +7111,7 @@
           <a:noFill/>
           <a:ln>
             <a:solidFill>
-              <a:srgbClr val="000000"/>
+              <a:srgbClr val="ffffff"/>
             </a:solidFill>
             <a:tailEnd len="med" type="triangle" w="med"/>
           </a:ln>
@@ -7737,14 +7125,14 @@
       </p:sp>
       <p:sp>
         <p:nvSpPr>
-          <p:cNvPr id="202" name="CustomShape 24"/>
+          <p:cNvPr id="190" name="CustomShape 13"/>
           <p:cNvSpPr/>
           <p:nvPr/>
         </p:nvSpPr>
         <p:spPr>
           <a:xfrm>
-            <a:off x="2304000" y="3042360"/>
-            <a:ext cx="1042920" cy="359280"/>
+            <a:off x="2304000" y="3042720"/>
+            <a:ext cx="1042560" cy="358920"/>
           </a:xfrm>
           <a:prstGeom prst="roundRect">
             <a:avLst>
@@ -7798,14 +7186,14 @@
       </p:sp>
       <p:sp>
         <p:nvSpPr>
-          <p:cNvPr id="203" name="CustomShape 25"/>
+          <p:cNvPr id="191" name="CustomShape 14"/>
           <p:cNvSpPr/>
           <p:nvPr/>
         </p:nvSpPr>
         <p:spPr>
           <a:xfrm>
-            <a:off x="4050000" y="4020480"/>
-            <a:ext cx="1006920" cy="359280"/>
+            <a:off x="4050000" y="3048840"/>
+            <a:ext cx="1006560" cy="358920"/>
           </a:xfrm>
           <a:prstGeom prst="roundRect">
             <a:avLst>
@@ -7859,18 +7247,18 @@
       </p:sp>
       <p:pic>
         <p:nvPicPr>
-          <p:cNvPr id="204" name="" descr=""/>
+          <p:cNvPr id="192" name="" descr=""/>
           <p:cNvPicPr/>
           <p:nvPr/>
         </p:nvPicPr>
         <p:blipFill>
-          <a:blip r:embed="rId4"/>
+          <a:blip r:embed="rId3"/>
           <a:stretch/>
         </p:blipFill>
         <p:spPr>
           <a:xfrm>
-            <a:off x="1152360" y="3978000"/>
-            <a:ext cx="455400" cy="444240"/>
+            <a:off x="1152360" y="3978360"/>
+            <a:ext cx="455040" cy="443880"/>
           </a:xfrm>
           <a:prstGeom prst="rect">
             <a:avLst/>
@@ -7880,6 +7268,673 @@
           </a:ln>
         </p:spPr>
       </p:pic>
+      <p:cxnSp>
+        <p:nvCxnSpPr>
+          <p:cNvPr id="193" name="Line 15"/>
+          <p:cNvCxnSpPr/>
+          <p:nvPr/>
+        </p:nvCxnSpPr>
+        <p:spPr>
+          <a:xfrm>
+            <a:off x="0" y="0"/>
+            <a:ext cx="360" cy="360"/>
+          </a:xfrm>
+          <a:prstGeom prst="line">
+            <a:avLst/>
+          </a:prstGeom>
+          <a:ln>
+            <a:solidFill>
+              <a:srgbClr val="ffffff"/>
+            </a:solidFill>
+            <a:tailEnd len="med" type="triangle" w="med"/>
+          </a:ln>
+        </p:spPr>
+      </p:cxnSp>
+      <p:cxnSp>
+        <p:nvCxnSpPr>
+          <p:cNvPr id="194" name="Line 16"/>
+          <p:cNvCxnSpPr/>
+          <p:nvPr/>
+        </p:nvCxnSpPr>
+        <p:spPr>
+          <a:xfrm>
+            <a:off x="0" y="0"/>
+            <a:ext cx="360" cy="360"/>
+          </a:xfrm>
+          <a:prstGeom prst="line">
+            <a:avLst/>
+          </a:prstGeom>
+          <a:ln>
+            <a:solidFill>
+              <a:srgbClr val="ffffff"/>
+            </a:solidFill>
+            <a:tailEnd len="med" type="triangle" w="med"/>
+          </a:ln>
+        </p:spPr>
+      </p:cxnSp>
+      <p:cxnSp>
+        <p:nvCxnSpPr>
+          <p:cNvPr id="195" name="Line 17"/>
+          <p:cNvCxnSpPr/>
+          <p:nvPr/>
+        </p:nvCxnSpPr>
+        <p:spPr>
+          <a:xfrm>
+            <a:off x="0" y="0"/>
+            <a:ext cx="360" cy="360"/>
+          </a:xfrm>
+          <a:prstGeom prst="line">
+            <a:avLst/>
+          </a:prstGeom>
+          <a:ln>
+            <a:solidFill>
+              <a:srgbClr val="ffffff"/>
+            </a:solidFill>
+            <a:tailEnd len="med" type="triangle" w="med"/>
+          </a:ln>
+        </p:spPr>
+      </p:cxnSp>
+      <p:cxnSp>
+        <p:nvCxnSpPr>
+          <p:cNvPr id="196" name="Line 18"/>
+          <p:cNvCxnSpPr/>
+          <p:nvPr/>
+        </p:nvCxnSpPr>
+        <p:spPr>
+          <a:xfrm>
+            <a:off x="0" y="0"/>
+            <a:ext cx="360" cy="360"/>
+          </a:xfrm>
+          <a:prstGeom prst="line">
+            <a:avLst/>
+          </a:prstGeom>
+          <a:ln>
+            <a:solidFill>
+              <a:srgbClr val="ffffff"/>
+            </a:solidFill>
+            <a:tailEnd len="med" type="triangle" w="med"/>
+          </a:ln>
+        </p:spPr>
+      </p:cxnSp>
+      <p:cxnSp>
+        <p:nvCxnSpPr>
+          <p:cNvPr id="197" name="Line 19"/>
+          <p:cNvCxnSpPr/>
+          <p:nvPr/>
+        </p:nvCxnSpPr>
+        <p:spPr>
+          <a:xfrm>
+            <a:off x="0" y="0"/>
+            <a:ext cx="360" cy="360"/>
+          </a:xfrm>
+          <a:prstGeom prst="line">
+            <a:avLst/>
+          </a:prstGeom>
+          <a:ln>
+            <a:solidFill>
+              <a:srgbClr val="ffffff"/>
+            </a:solidFill>
+            <a:tailEnd len="med" type="triangle" w="med"/>
+          </a:ln>
+        </p:spPr>
+      </p:cxnSp>
+      <p:cxnSp>
+        <p:nvCxnSpPr>
+          <p:cNvPr id="198" name="Line 20"/>
+          <p:cNvCxnSpPr/>
+          <p:nvPr/>
+        </p:nvCxnSpPr>
+        <p:spPr>
+          <a:xfrm>
+            <a:off x="0" y="0"/>
+            <a:ext cx="360" cy="360"/>
+          </a:xfrm>
+          <a:prstGeom prst="line">
+            <a:avLst/>
+          </a:prstGeom>
+          <a:ln>
+            <a:solidFill>
+              <a:srgbClr val="ffffff"/>
+            </a:solidFill>
+            <a:tailEnd len="med" type="triangle" w="med"/>
+          </a:ln>
+        </p:spPr>
+      </p:cxnSp>
+      <p:sp>
+        <p:nvSpPr>
+          <p:cNvPr id="199" name="CustomShape 21"/>
+          <p:cNvSpPr/>
+          <p:nvPr/>
+        </p:nvSpPr>
+        <p:spPr>
+          <a:xfrm>
+            <a:off x="4050360" y="4020840"/>
+            <a:ext cx="1006560" cy="358920"/>
+          </a:xfrm>
+          <a:prstGeom prst="roundRect">
+            <a:avLst>
+              <a:gd name="adj" fmla="val 16667"/>
+            </a:avLst>
+          </a:prstGeom>
+          <a:solidFill>
+            <a:srgbClr val="eeeeee"/>
+          </a:solidFill>
+          <a:ln w="28440">
+            <a:solidFill>
+              <a:srgbClr val="ff0000"/>
+            </a:solidFill>
+            <a:round/>
+          </a:ln>
+        </p:spPr>
+        <p:style>
+          <a:lnRef idx="0"/>
+          <a:fillRef idx="0"/>
+          <a:effectRef idx="0"/>
+          <a:fontRef idx="minor"/>
+        </p:style>
+        <p:txBody>
+          <a:bodyPr lIns="90000" rIns="90000" tIns="91440" bIns="91440" anchor="ctr">
+            <a:noAutofit/>
+          </a:bodyPr>
+          <a:p>
+            <a:pPr algn="ctr">
+              <a:lnSpc>
+                <a:spcPct val="100000"/>
+              </a:lnSpc>
+              <a:tabLst>
+                <a:tab algn="l" pos="0"/>
+              </a:tabLst>
+            </a:pPr>
+            <a:r>
+              <a:rPr b="0" lang="en-US" sz="800" spc="-1" strike="noStrike">
+                <a:solidFill>
+                  <a:srgbClr val="000000"/>
+                </a:solidFill>
+                <a:latin typeface="Arial"/>
+                <a:ea typeface="Arial"/>
+              </a:rPr>
+              <a:t>Corri</a:t>
+            </a:r>
+            <a:r>
+              <a:rPr b="0" lang="en-US" sz="800" spc="-1" strike="noStrike">
+                <a:solidFill>
+                  <a:srgbClr val="000000"/>
+                </a:solidFill>
+                <a:latin typeface="Arial"/>
+                <a:ea typeface="Arial"/>
+              </a:rPr>
+              <a:t>gir</a:t>
+            </a:r>
+            <a:endParaRPr b="0" lang="pt-BR" sz="800" spc="-1" strike="noStrike">
+              <a:latin typeface="Arial"/>
+            </a:endParaRPr>
+          </a:p>
+        </p:txBody>
+      </p:sp>
+      <p:cxnSp>
+        <p:nvCxnSpPr>
+          <p:cNvPr id="200" name="Line 22"/>
+          <p:cNvCxnSpPr/>
+          <p:nvPr/>
+        </p:nvCxnSpPr>
+        <p:spPr>
+          <a:xfrm>
+            <a:off x="0" y="0"/>
+            <a:ext cx="360" cy="360"/>
+          </a:xfrm>
+          <a:prstGeom prst="line">
+            <a:avLst/>
+          </a:prstGeom>
+          <a:ln>
+            <a:solidFill>
+              <a:srgbClr val="ffffff"/>
+            </a:solidFill>
+            <a:tailEnd len="med" type="triangle" w="med"/>
+          </a:ln>
+        </p:spPr>
+      </p:cxnSp>
+      <p:cxnSp>
+        <p:nvCxnSpPr>
+          <p:cNvPr id="201" name="Line 23"/>
+          <p:cNvCxnSpPr/>
+          <p:nvPr/>
+        </p:nvCxnSpPr>
+        <p:spPr>
+          <a:xfrm>
+            <a:off x="0" y="0"/>
+            <a:ext cx="360" cy="360"/>
+          </a:xfrm>
+          <a:prstGeom prst="line">
+            <a:avLst/>
+          </a:prstGeom>
+          <a:ln>
+            <a:solidFill>
+              <a:srgbClr val="ffffff"/>
+            </a:solidFill>
+            <a:tailEnd len="med" type="triangle" w="med"/>
+          </a:ln>
+        </p:spPr>
+      </p:cxnSp>
+      <p:cxnSp>
+        <p:nvCxnSpPr>
+          <p:cNvPr id="202" name="Line 24"/>
+          <p:cNvCxnSpPr/>
+          <p:nvPr/>
+        </p:nvCxnSpPr>
+        <p:spPr>
+          <a:xfrm>
+            <a:off x="0" y="0"/>
+            <a:ext cx="360" cy="360"/>
+          </a:xfrm>
+          <a:prstGeom prst="line">
+            <a:avLst/>
+          </a:prstGeom>
+          <a:ln>
+            <a:solidFill>
+              <a:srgbClr val="ffffff"/>
+            </a:solidFill>
+            <a:tailEnd len="med" type="triangle" w="med"/>
+          </a:ln>
+        </p:spPr>
+      </p:cxnSp>
+      <p:sp>
+        <p:nvSpPr>
+          <p:cNvPr id="203" name="CustomShape 25"/>
+          <p:cNvSpPr/>
+          <p:nvPr/>
+        </p:nvSpPr>
+        <p:spPr>
+          <a:xfrm>
+            <a:off x="2454840" y="2520360"/>
+            <a:ext cx="387720" cy="255960"/>
+          </a:xfrm>
+          <a:prstGeom prst="rect">
+            <a:avLst/>
+          </a:prstGeom>
+          <a:noFill/>
+          <a:ln>
+            <a:noFill/>
+          </a:ln>
+        </p:spPr>
+        <p:style>
+          <a:lnRef idx="0"/>
+          <a:fillRef idx="0"/>
+          <a:effectRef idx="0"/>
+          <a:fontRef idx="minor"/>
+        </p:style>
+        <p:txBody>
+          <a:bodyPr lIns="90000" rIns="90000" tIns="45000" bIns="45000">
+            <a:noAutofit/>
+          </a:bodyPr>
+          <a:p>
+            <a:pPr>
+              <a:lnSpc>
+                <a:spcPct val="100000"/>
+              </a:lnSpc>
+            </a:pPr>
+            <a:r>
+              <a:rPr b="0" lang="en-US" sz="900" spc="-1" strike="noStrike">
+                <a:solidFill>
+                  <a:srgbClr val="ffffff"/>
+                </a:solidFill>
+                <a:latin typeface="Arial"/>
+                <a:ea typeface="Arial"/>
+              </a:rPr>
+              <a:t>S</a:t>
+            </a:r>
+            <a:r>
+              <a:rPr b="0" lang="en-US" sz="900" spc="-1" strike="noStrike">
+                <a:solidFill>
+                  <a:srgbClr val="ffffff"/>
+                </a:solidFill>
+                <a:latin typeface="Arial"/>
+                <a:ea typeface="Arial"/>
+              </a:rPr>
+              <a:t>i</a:t>
+            </a:r>
+            <a:r>
+              <a:rPr b="0" lang="en-US" sz="900" spc="-1" strike="noStrike">
+                <a:solidFill>
+                  <a:srgbClr val="ffffff"/>
+                </a:solidFill>
+                <a:latin typeface="Arial"/>
+                <a:ea typeface="Arial"/>
+              </a:rPr>
+              <a:t>m</a:t>
+            </a:r>
+            <a:endParaRPr b="0" lang="pt-BR" sz="900" spc="-1" strike="noStrike">
+              <a:solidFill>
+                <a:srgbClr val="ffffff"/>
+              </a:solidFill>
+              <a:latin typeface="Arial"/>
+            </a:endParaRPr>
+          </a:p>
+        </p:txBody>
+      </p:sp>
+      <p:sp>
+        <p:nvSpPr>
+          <p:cNvPr id="204" name="CustomShape 26"/>
+          <p:cNvSpPr/>
+          <p:nvPr/>
+        </p:nvSpPr>
+        <p:spPr>
+          <a:xfrm>
+            <a:off x="1986840" y="1980360"/>
+            <a:ext cx="461160" cy="255960"/>
+          </a:xfrm>
+          <a:prstGeom prst="rect">
+            <a:avLst/>
+          </a:prstGeom>
+          <a:noFill/>
+          <a:ln>
+            <a:noFill/>
+          </a:ln>
+        </p:spPr>
+        <p:style>
+          <a:lnRef idx="0"/>
+          <a:fillRef idx="0"/>
+          <a:effectRef idx="0"/>
+          <a:fontRef idx="minor"/>
+        </p:style>
+        <p:txBody>
+          <a:bodyPr lIns="90000" rIns="90000" tIns="45000" bIns="45000">
+            <a:noAutofit/>
+          </a:bodyPr>
+          <a:p>
+            <a:pPr>
+              <a:lnSpc>
+                <a:spcPct val="100000"/>
+              </a:lnSpc>
+            </a:pPr>
+            <a:r>
+              <a:rPr b="0" lang="en-US" sz="900" spc="-1" strike="noStrike">
+                <a:solidFill>
+                  <a:srgbClr val="ffffff"/>
+                </a:solidFill>
+                <a:latin typeface="Arial"/>
+                <a:ea typeface="Arial"/>
+              </a:rPr>
+              <a:t>Não</a:t>
+            </a:r>
+            <a:endParaRPr b="0" lang="pt-BR" sz="900" spc="-1" strike="noStrike">
+              <a:solidFill>
+                <a:srgbClr val="ffffff"/>
+              </a:solidFill>
+              <a:latin typeface="Arial"/>
+            </a:endParaRPr>
+          </a:p>
+        </p:txBody>
+      </p:sp>
+      <p:sp>
+        <p:nvSpPr>
+          <p:cNvPr id="205" name="CustomShape 27"/>
+          <p:cNvSpPr/>
+          <p:nvPr/>
+        </p:nvSpPr>
+        <p:spPr>
+          <a:xfrm>
+            <a:off x="6090840" y="3456360"/>
+            <a:ext cx="461160" cy="255960"/>
+          </a:xfrm>
+          <a:prstGeom prst="rect">
+            <a:avLst/>
+          </a:prstGeom>
+          <a:noFill/>
+          <a:ln>
+            <a:noFill/>
+          </a:ln>
+        </p:spPr>
+        <p:style>
+          <a:lnRef idx="0"/>
+          <a:fillRef idx="0"/>
+          <a:effectRef idx="0"/>
+          <a:fontRef idx="minor"/>
+        </p:style>
+        <p:txBody>
+          <a:bodyPr lIns="90000" rIns="90000" tIns="45000" bIns="45000">
+            <a:noAutofit/>
+          </a:bodyPr>
+          <a:p>
+            <a:pPr>
+              <a:lnSpc>
+                <a:spcPct val="100000"/>
+              </a:lnSpc>
+            </a:pPr>
+            <a:r>
+              <a:rPr b="0" lang="en-US" sz="900" spc="-1" strike="noStrike">
+                <a:solidFill>
+                  <a:srgbClr val="ffffff"/>
+                </a:solidFill>
+                <a:latin typeface="Arial"/>
+                <a:ea typeface="Arial"/>
+              </a:rPr>
+              <a:t>Não</a:t>
+            </a:r>
+            <a:endParaRPr b="0" lang="pt-BR" sz="900" spc="-1" strike="noStrike">
+              <a:solidFill>
+                <a:srgbClr val="ffffff"/>
+              </a:solidFill>
+              <a:latin typeface="Arial"/>
+            </a:endParaRPr>
+          </a:p>
+        </p:txBody>
+      </p:sp>
+      <p:sp>
+        <p:nvSpPr>
+          <p:cNvPr id="206" name="CustomShape 28"/>
+          <p:cNvSpPr/>
+          <p:nvPr/>
+        </p:nvSpPr>
+        <p:spPr>
+          <a:xfrm>
+            <a:off x="6090840" y="2736360"/>
+            <a:ext cx="461160" cy="255960"/>
+          </a:xfrm>
+          <a:prstGeom prst="rect">
+            <a:avLst/>
+          </a:prstGeom>
+          <a:noFill/>
+          <a:ln>
+            <a:noFill/>
+          </a:ln>
+        </p:spPr>
+        <p:style>
+          <a:lnRef idx="0"/>
+          <a:fillRef idx="0"/>
+          <a:effectRef idx="0"/>
+          <a:fontRef idx="minor"/>
+        </p:style>
+        <p:txBody>
+          <a:bodyPr lIns="90000" rIns="90000" tIns="45000" bIns="45000">
+            <a:noAutofit/>
+          </a:bodyPr>
+          <a:p>
+            <a:pPr>
+              <a:lnSpc>
+                <a:spcPct val="100000"/>
+              </a:lnSpc>
+            </a:pPr>
+            <a:r>
+              <a:rPr b="0" lang="en-US" sz="900" spc="-1" strike="noStrike">
+                <a:solidFill>
+                  <a:srgbClr val="ffffff"/>
+                </a:solidFill>
+                <a:latin typeface="Arial"/>
+                <a:ea typeface="Arial"/>
+              </a:rPr>
+              <a:t>Sim</a:t>
+            </a:r>
+            <a:endParaRPr b="0" lang="pt-BR" sz="900" spc="-1" strike="noStrike">
+              <a:solidFill>
+                <a:srgbClr val="ffffff"/>
+              </a:solidFill>
+              <a:latin typeface="Arial"/>
+            </a:endParaRPr>
+          </a:p>
+        </p:txBody>
+      </p:sp>
+      <p:sp>
+        <p:nvSpPr>
+          <p:cNvPr id="207" name="CustomShape 29"/>
+          <p:cNvSpPr/>
+          <p:nvPr/>
+        </p:nvSpPr>
+        <p:spPr>
+          <a:xfrm>
+            <a:off x="2778840" y="2628360"/>
+            <a:ext cx="874440" cy="255960"/>
+          </a:xfrm>
+          <a:prstGeom prst="rect">
+            <a:avLst/>
+          </a:prstGeom>
+          <a:noFill/>
+          <a:ln>
+            <a:noFill/>
+          </a:ln>
+        </p:spPr>
+        <p:style>
+          <a:lnRef idx="0"/>
+          <a:fillRef idx="0"/>
+          <a:effectRef idx="0"/>
+          <a:fontRef idx="minor"/>
+        </p:style>
+        <p:txBody>
+          <a:bodyPr lIns="90000" rIns="90000" tIns="45000" bIns="45000">
+            <a:noAutofit/>
+          </a:bodyPr>
+          <a:p>
+            <a:pPr>
+              <a:lnSpc>
+                <a:spcPct val="100000"/>
+              </a:lnSpc>
+            </a:pPr>
+            <a:r>
+              <a:rPr b="0" lang="en-US" sz="900" spc="-1" strike="noStrike">
+                <a:solidFill>
+                  <a:srgbClr val="ffffff"/>
+                </a:solidFill>
+                <a:latin typeface="Arial"/>
+                <a:ea typeface="Arial"/>
+              </a:rPr>
+              <a:t>Cadastrador</a:t>
+            </a:r>
+            <a:endParaRPr b="0" lang="pt-BR" sz="900" spc="-1" strike="noStrike">
+              <a:solidFill>
+                <a:srgbClr val="ffffff"/>
+              </a:solidFill>
+              <a:latin typeface="Arial"/>
+            </a:endParaRPr>
+          </a:p>
+        </p:txBody>
+      </p:sp>
+      <p:sp>
+        <p:nvSpPr>
+          <p:cNvPr id="208" name="CustomShape 30"/>
+          <p:cNvSpPr/>
+          <p:nvPr/>
+        </p:nvSpPr>
+        <p:spPr>
+          <a:xfrm>
+            <a:off x="1158840" y="1620360"/>
+            <a:ext cx="874440" cy="255960"/>
+          </a:xfrm>
+          <a:prstGeom prst="rect">
+            <a:avLst/>
+          </a:prstGeom>
+          <a:noFill/>
+          <a:ln>
+            <a:noFill/>
+          </a:ln>
+        </p:spPr>
+        <p:style>
+          <a:lnRef idx="0"/>
+          <a:fillRef idx="0"/>
+          <a:effectRef idx="0"/>
+          <a:fontRef idx="minor"/>
+        </p:style>
+        <p:txBody>
+          <a:bodyPr lIns="90000" rIns="90000" tIns="45000" bIns="45000">
+            <a:noAutofit/>
+          </a:bodyPr>
+          <a:p>
+            <a:pPr>
+              <a:lnSpc>
+                <a:spcPct val="100000"/>
+              </a:lnSpc>
+            </a:pPr>
+            <a:r>
+              <a:rPr b="0" lang="en-US" sz="900" spc="-1" strike="noStrike">
+                <a:solidFill>
+                  <a:srgbClr val="ffffff"/>
+                </a:solidFill>
+                <a:latin typeface="Arial"/>
+                <a:ea typeface="Arial"/>
+              </a:rPr>
+              <a:t>Visitante</a:t>
+            </a:r>
+            <a:endParaRPr b="0" lang="pt-BR" sz="900" spc="-1" strike="noStrike">
+              <a:solidFill>
+                <a:srgbClr val="ffffff"/>
+              </a:solidFill>
+              <a:latin typeface="Arial"/>
+            </a:endParaRPr>
+          </a:p>
+        </p:txBody>
+      </p:sp>
+      <p:sp>
+        <p:nvSpPr>
+          <p:cNvPr id="209" name="CustomShape 31"/>
+          <p:cNvSpPr/>
+          <p:nvPr/>
+        </p:nvSpPr>
+        <p:spPr>
+          <a:xfrm>
+            <a:off x="7170840" y="3492360"/>
+            <a:ext cx="533160" cy="255960"/>
+          </a:xfrm>
+          <a:prstGeom prst="rect">
+            <a:avLst/>
+          </a:prstGeom>
+          <a:noFill/>
+          <a:ln>
+            <a:noFill/>
+          </a:ln>
+        </p:spPr>
+        <p:style>
+          <a:lnRef idx="0"/>
+          <a:fillRef idx="0"/>
+          <a:effectRef idx="0"/>
+          <a:fontRef idx="minor"/>
+        </p:style>
+        <p:txBody>
+          <a:bodyPr lIns="90000" rIns="90000" tIns="45000" bIns="45000">
+            <a:noAutofit/>
+          </a:bodyPr>
+          <a:p>
+            <a:pPr>
+              <a:lnSpc>
+                <a:spcPct val="100000"/>
+              </a:lnSpc>
+            </a:pPr>
+            <a:r>
+              <a:rPr b="0" lang="en-US" sz="900" spc="-1" strike="noStrike">
+                <a:solidFill>
+                  <a:srgbClr val="ffffff"/>
+                </a:solidFill>
+                <a:latin typeface="Arial"/>
+                <a:ea typeface="Arial"/>
+              </a:rPr>
+              <a:t>Admin</a:t>
+            </a:r>
+            <a:endParaRPr b="0" lang="pt-BR" sz="900" spc="-1" strike="noStrike">
+              <a:solidFill>
+                <a:srgbClr val="ffffff"/>
+              </a:solidFill>
+              <a:latin typeface="Arial"/>
+            </a:endParaRPr>
+          </a:p>
+        </p:txBody>
+      </p:sp>
     </p:spTree>
   </p:cSld>
   <mc:AlternateContent>
@@ -7919,7 +7974,7 @@
         <p:spPr>
           <a:xfrm>
             <a:off x="311760" y="444960"/>
-            <a:ext cx="8519760" cy="572040"/>
+            <a:ext cx="8519400" cy="571680"/>
           </a:xfrm>
           <a:prstGeom prst="rect">
             <a:avLst/>
@@ -7973,7 +8028,7 @@
         <p:spPr>
           <a:xfrm>
             <a:off x="311760" y="1152360"/>
-            <a:ext cx="8519760" cy="3415680"/>
+            <a:ext cx="8519400" cy="3415680"/>
           </a:xfrm>
           <a:prstGeom prst="rect">
             <a:avLst/>
@@ -7994,7 +8049,7 @@
             <a:normAutofit/>
           </a:bodyPr>
           <a:p>
-            <a:pPr marL="457200" indent="-342360">
+            <a:pPr marL="457200" indent="-342000">
               <a:lnSpc>
                 <a:spcPct val="115000"/>
               </a:lnSpc>
@@ -8028,8 +8083,8 @@
         </p:nvSpPr>
         <p:spPr>
           <a:xfrm>
-            <a:off x="311760" y="2655000"/>
-            <a:ext cx="8519760" cy="572040"/>
+            <a:off x="311760" y="2655360"/>
+            <a:ext cx="8519400" cy="571680"/>
           </a:xfrm>
           <a:prstGeom prst="rect">
             <a:avLst/>
@@ -8082,8 +8137,8 @@
         </p:nvSpPr>
         <p:spPr>
           <a:xfrm>
-            <a:off x="311760" y="3362400"/>
-            <a:ext cx="8519760" cy="3415680"/>
+            <a:off x="311760" y="3362760"/>
+            <a:ext cx="8519400" cy="3415680"/>
           </a:xfrm>
           <a:prstGeom prst="rect">
             <a:avLst/>
@@ -8104,7 +8159,7 @@
             <a:normAutofit/>
           </a:bodyPr>
           <a:p>
-            <a:pPr marL="457200" indent="-342360">
+            <a:pPr marL="457200" indent="-342000">
               <a:lnSpc>
                 <a:spcPct val="115000"/>
               </a:lnSpc>
@@ -8169,7 +8224,7 @@
         <p:spPr>
           <a:xfrm>
             <a:off x="312120" y="744840"/>
-            <a:ext cx="8519400" cy="2051640"/>
+            <a:ext cx="8519040" cy="2051640"/>
           </a:xfrm>
           <a:prstGeom prst="rect">
             <a:avLst/>
@@ -8222,8 +8277,8 @@
         </p:nvSpPr>
         <p:spPr>
           <a:xfrm>
-            <a:off x="312120" y="2868480"/>
-            <a:ext cx="8519400" cy="2104560"/>
+            <a:off x="312120" y="2868840"/>
+            <a:ext cx="8519040" cy="2104560"/>
           </a:xfrm>
           <a:prstGeom prst="rect">
             <a:avLst/>
@@ -8307,7 +8362,7 @@
         <p:spPr>
           <a:xfrm>
             <a:off x="311760" y="1152360"/>
-            <a:ext cx="8519400" cy="3415320"/>
+            <a:ext cx="8519040" cy="3415320"/>
           </a:xfrm>
           <a:prstGeom prst="rect">
             <a:avLst/>
@@ -8328,7 +8383,7 @@
             <a:normAutofit/>
           </a:bodyPr>
           <a:p>
-            <a:pPr marL="457200" indent="-342000">
+            <a:pPr marL="457200" indent="-341640">
               <a:lnSpc>
                 <a:spcPct val="115000"/>
               </a:lnSpc>
@@ -8353,7 +8408,7 @@
             </a:endParaRPr>
           </a:p>
           <a:p>
-            <a:pPr marL="457200" indent="-342000">
+            <a:pPr marL="457200" indent="-341640">
               <a:lnSpc>
                 <a:spcPct val="115000"/>
               </a:lnSpc>
@@ -8378,7 +8433,7 @@
             </a:endParaRPr>
           </a:p>
           <a:p>
-            <a:pPr lvl="1" marL="914400" indent="-316440">
+            <a:pPr lvl="1" marL="914400" indent="-316080">
               <a:lnSpc>
                 <a:spcPct val="115000"/>
               </a:lnSpc>
@@ -8403,7 +8458,7 @@
             </a:endParaRPr>
           </a:p>
           <a:p>
-            <a:pPr lvl="1" marL="914400" indent="-316440">
+            <a:pPr lvl="1" marL="914400" indent="-316080">
               <a:lnSpc>
                 <a:spcPct val="115000"/>
               </a:lnSpc>
@@ -8438,7 +8493,7 @@
             </a:endParaRPr>
           </a:p>
           <a:p>
-            <a:pPr marL="457200" indent="-342000">
+            <a:pPr marL="457200" indent="-341640">
               <a:lnSpc>
                 <a:spcPct val="115000"/>
               </a:lnSpc>
@@ -8463,7 +8518,7 @@
             </a:endParaRPr>
           </a:p>
           <a:p>
-            <a:pPr marL="457200" indent="-342000">
+            <a:pPr marL="457200" indent="-341640">
               <a:lnSpc>
                 <a:spcPct val="115000"/>
               </a:lnSpc>
@@ -8498,7 +8553,7 @@
         <p:spPr>
           <a:xfrm>
             <a:off x="312480" y="292680"/>
-            <a:ext cx="8519400" cy="571680"/>
+            <a:ext cx="8519040" cy="571320"/>
           </a:xfrm>
           <a:prstGeom prst="rect">
             <a:avLst/>
@@ -8582,7 +8637,7 @@
         <p:spPr>
           <a:xfrm>
             <a:off x="311760" y="1152360"/>
-            <a:ext cx="7751520" cy="3415320"/>
+            <a:ext cx="7751160" cy="3415320"/>
           </a:xfrm>
           <a:prstGeom prst="rect">
             <a:avLst/>
@@ -8603,7 +8658,7 @@
             <a:normAutofit/>
           </a:bodyPr>
           <a:p>
-            <a:pPr marL="457200" indent="-342000">
+            <a:pPr marL="457200" indent="-341640">
               <a:lnSpc>
                 <a:spcPct val="115000"/>
               </a:lnSpc>
@@ -8628,7 +8683,7 @@
             </a:endParaRPr>
           </a:p>
           <a:p>
-            <a:pPr lvl="1" marL="914400" indent="-316440">
+            <a:pPr lvl="1" marL="914400" indent="-316080">
               <a:lnSpc>
                 <a:spcPct val="115000"/>
               </a:lnSpc>
@@ -8653,7 +8708,7 @@
             </a:endParaRPr>
           </a:p>
           <a:p>
-            <a:pPr lvl="2" marL="1296000" indent="-287280">
+            <a:pPr lvl="2" marL="1296000" indent="-286920">
               <a:lnSpc>
                 <a:spcPct val="100000"/>
               </a:lnSpc>
@@ -8682,7 +8737,7 @@
             </a:endParaRPr>
           </a:p>
           <a:p>
-            <a:pPr lvl="1" marL="914400" indent="-316440">
+            <a:pPr lvl="1" marL="914400" indent="-316080">
               <a:lnSpc>
                 <a:spcPct val="115000"/>
               </a:lnSpc>
@@ -8707,7 +8762,7 @@
             </a:endParaRPr>
           </a:p>
           <a:p>
-            <a:pPr lvl="1" marL="914400" indent="-316440">
+            <a:pPr lvl="1" marL="914400" indent="-316080">
               <a:lnSpc>
                 <a:spcPct val="115000"/>
               </a:lnSpc>
@@ -8742,7 +8797,7 @@
         <p:spPr>
           <a:xfrm>
             <a:off x="312480" y="292680"/>
-            <a:ext cx="8519400" cy="571680"/>
+            <a:ext cx="8519040" cy="571320"/>
           </a:xfrm>
           <a:prstGeom prst="rect">
             <a:avLst/>
@@ -8826,7 +8881,7 @@
         <p:spPr>
           <a:xfrm>
             <a:off x="311760" y="1017720"/>
-            <a:ext cx="8183520" cy="925560"/>
+            <a:ext cx="8183160" cy="925200"/>
           </a:xfrm>
           <a:prstGeom prst="rect">
             <a:avLst/>
@@ -8847,7 +8902,7 @@
             <a:normAutofit fontScale="97000"/>
           </a:bodyPr>
           <a:p>
-            <a:pPr marL="457200" indent="-342000">
+            <a:pPr marL="457200" indent="-341640">
               <a:lnSpc>
                 <a:spcPct val="115000"/>
               </a:lnSpc>
@@ -8872,7 +8927,7 @@
             </a:endParaRPr>
           </a:p>
           <a:p>
-            <a:pPr lvl="1" marL="914400" indent="-316440">
+            <a:pPr lvl="1" marL="914400" indent="-316080">
               <a:lnSpc>
                 <a:spcPct val="115000"/>
               </a:lnSpc>
@@ -8897,7 +8952,7 @@
             </a:endParaRPr>
           </a:p>
           <a:p>
-            <a:pPr lvl="1" marL="914400" indent="-316440">
+            <a:pPr lvl="1" marL="914400" indent="-316080">
               <a:lnSpc>
                 <a:spcPct val="115000"/>
               </a:lnSpc>
@@ -8931,8 +8986,8 @@
         </p:nvSpPr>
         <p:spPr>
           <a:xfrm>
-            <a:off x="312120" y="2601720"/>
-            <a:ext cx="8183520" cy="1141560"/>
+            <a:off x="312120" y="2602080"/>
+            <a:ext cx="8183160" cy="1141200"/>
           </a:xfrm>
           <a:prstGeom prst="rect">
             <a:avLst/>
@@ -8953,7 +9008,7 @@
             <a:normAutofit/>
           </a:bodyPr>
           <a:p>
-            <a:pPr marL="457200" indent="-342000">
+            <a:pPr marL="457200" indent="-341640">
               <a:lnSpc>
                 <a:spcPct val="115000"/>
               </a:lnSpc>
@@ -8978,7 +9033,7 @@
             </a:endParaRPr>
           </a:p>
           <a:p>
-            <a:pPr lvl="1" marL="914400" indent="-316440">
+            <a:pPr lvl="1" marL="914400" indent="-316080">
               <a:lnSpc>
                 <a:spcPct val="115000"/>
               </a:lnSpc>
@@ -9013,7 +9068,7 @@
         <p:spPr>
           <a:xfrm>
             <a:off x="312480" y="292680"/>
-            <a:ext cx="8519400" cy="571680"/>
+            <a:ext cx="8519040" cy="571320"/>
           </a:xfrm>
           <a:prstGeom prst="rect">
             <a:avLst/>
@@ -9067,7 +9122,7 @@
         <p:spPr>
           <a:xfrm>
             <a:off x="312480" y="2092680"/>
-            <a:ext cx="8519400" cy="571680"/>
+            <a:ext cx="8519040" cy="571320"/>
           </a:xfrm>
           <a:prstGeom prst="rect">
             <a:avLst/>
@@ -9151,7 +9206,7 @@
         <p:spPr>
           <a:xfrm>
             <a:off x="311760" y="1152360"/>
-            <a:ext cx="8519400" cy="3415320"/>
+            <a:ext cx="8519040" cy="3415320"/>
           </a:xfrm>
           <a:prstGeom prst="rect">
             <a:avLst/>
@@ -9172,7 +9227,7 @@
             <a:normAutofit/>
           </a:bodyPr>
           <a:p>
-            <a:pPr marL="457200" indent="-342000">
+            <a:pPr marL="457200" indent="-341640">
               <a:lnSpc>
                 <a:spcPct val="115000"/>
               </a:lnSpc>
@@ -9197,7 +9252,7 @@
             </a:endParaRPr>
           </a:p>
           <a:p>
-            <a:pPr lvl="1" marL="914400" indent="-316440">
+            <a:pPr lvl="1" marL="914400" indent="-316080">
               <a:lnSpc>
                 <a:spcPct val="115000"/>
               </a:lnSpc>
@@ -9222,7 +9277,7 @@
             </a:endParaRPr>
           </a:p>
           <a:p>
-            <a:pPr lvl="1" marL="914400" indent="-316440">
+            <a:pPr lvl="1" marL="914400" indent="-316080">
               <a:lnSpc>
                 <a:spcPct val="115000"/>
               </a:lnSpc>
@@ -9247,7 +9302,7 @@
             </a:endParaRPr>
           </a:p>
           <a:p>
-            <a:pPr lvl="1" marL="914400" indent="-316440">
+            <a:pPr lvl="1" marL="914400" indent="-316080">
               <a:lnSpc>
                 <a:spcPct val="115000"/>
               </a:lnSpc>
@@ -9292,7 +9347,7 @@
             </a:endParaRPr>
           </a:p>
           <a:p>
-            <a:pPr lvl="1" marL="914400" indent="-316440">
+            <a:pPr lvl="1" marL="914400" indent="-316080">
               <a:lnSpc>
                 <a:spcPct val="115000"/>
               </a:lnSpc>
@@ -9317,7 +9372,7 @@
             </a:endParaRPr>
           </a:p>
           <a:p>
-            <a:pPr lvl="1" marL="914400" indent="-316440">
+            <a:pPr lvl="1" marL="914400" indent="-316080">
               <a:lnSpc>
                 <a:spcPct val="115000"/>
               </a:lnSpc>
@@ -9352,7 +9407,7 @@
         <p:spPr>
           <a:xfrm>
             <a:off x="312480" y="292680"/>
-            <a:ext cx="8519400" cy="571680"/>
+            <a:ext cx="8519040" cy="571320"/>
           </a:xfrm>
           <a:prstGeom prst="rect">
             <a:avLst/>
@@ -9436,7 +9491,7 @@
         <p:spPr>
           <a:xfrm>
             <a:off x="1064520" y="1256400"/>
-            <a:ext cx="6772680" cy="2854440"/>
+            <a:ext cx="6772320" cy="2854440"/>
           </a:xfrm>
           <a:prstGeom prst="rect">
             <a:avLst/>
@@ -9757,7 +9812,7 @@
         <p:spPr>
           <a:xfrm>
             <a:off x="312480" y="292680"/>
-            <a:ext cx="8519400" cy="571680"/>
+            <a:ext cx="8519040" cy="571320"/>
           </a:xfrm>
           <a:prstGeom prst="rect">
             <a:avLst/>
@@ -9841,7 +9896,7 @@
         <p:spPr>
           <a:xfrm>
             <a:off x="1902240" y="2129760"/>
-            <a:ext cx="1085040" cy="497520"/>
+            <a:ext cx="1084680" cy="497160"/>
           </a:xfrm>
           <a:prstGeom prst="roundRect">
             <a:avLst>
@@ -9885,37 +9940,7 @@
                 <a:latin typeface="Arial"/>
                 <a:ea typeface="Arial"/>
               </a:rPr>
-              <a:t>Home: </a:t>
-            </a:r>
-            <a:r>
-              <a:rPr b="0" lang="en-US" sz="800" spc="-1" strike="noStrike">
-                <a:solidFill>
-                  <a:srgbClr val="000000"/>
-                </a:solidFill>
-                <a:latin typeface="Arial"/>
-                <a:ea typeface="Arial"/>
-              </a:rPr>
-              <a:t>[ Menu,  </a:t>
-            </a:r>
-            <a:r>
-              <a:rPr b="0" lang="en-US" sz="800" spc="-1" strike="noStrike">
-                <a:solidFill>
-                  <a:srgbClr val="000000"/>
-                </a:solidFill>
-                <a:latin typeface="Arial"/>
-                <a:ea typeface="Arial"/>
-              </a:rPr>
-              <a:t>Header,  </a:t>
-            </a:r>
-            <a:r>
-              <a:rPr b="0" lang="en-US" sz="800" spc="-1" strike="noStrike">
-                <a:solidFill>
-                  <a:srgbClr val="000000"/>
-                </a:solidFill>
-                <a:latin typeface="Arial"/>
-                <a:ea typeface="Arial"/>
-              </a:rPr>
-              <a:t>Footer ]</a:t>
+              <a:t>Home: [ Menu,  Header,  Footer ]</a:t>
             </a:r>
             <a:endParaRPr b="0" lang="pt-BR" sz="800" spc="-1" strike="noStrike">
               <a:latin typeface="Arial"/>
@@ -9936,7 +9961,7 @@
         <p:spPr>
           <a:xfrm>
             <a:off x="756000" y="1689840"/>
-            <a:ext cx="503280" cy="725400"/>
+            <a:ext cx="502920" cy="725040"/>
           </a:xfrm>
           <a:prstGeom prst="rect">
             <a:avLst/>
@@ -9955,7 +9980,7 @@
         <p:spPr>
           <a:xfrm>
             <a:off x="1195200" y="1866960"/>
-            <a:ext cx="604080" cy="256320"/>
+            <a:ext cx="603720" cy="255960"/>
           </a:xfrm>
           <a:prstGeom prst="rect">
             <a:avLst/>
@@ -10006,7 +10031,7 @@
         <p:spPr>
           <a:xfrm>
             <a:off x="3744360" y="2484000"/>
-            <a:ext cx="718920" cy="467280"/>
+            <a:ext cx="718560" cy="466920"/>
           </a:xfrm>
           <a:prstGeom prst="roundRect">
             <a:avLst>
@@ -10067,7 +10092,7 @@
         <p:spPr>
           <a:xfrm>
             <a:off x="2988000" y="2378880"/>
-            <a:ext cx="756000" cy="338760"/>
+            <a:ext cx="755640" cy="338400"/>
           </a:xfrm>
           <a:prstGeom prst="bentConnector3">
             <a:avLst>
@@ -10097,8 +10122,8 @@
         </p:nvSpPr>
         <p:spPr>
           <a:xfrm>
-            <a:off x="5220000" y="2771640"/>
-            <a:ext cx="1078920" cy="611640"/>
+            <a:off x="5220000" y="2772000"/>
+            <a:ext cx="1078560" cy="611280"/>
           </a:xfrm>
           <a:prstGeom prst="roundRect">
             <a:avLst>
@@ -10158,8 +10183,8 @@
         </p:nvSpPr>
         <p:spPr>
           <a:xfrm>
-            <a:off x="4464000" y="2718000"/>
-            <a:ext cx="755640" cy="359280"/>
+            <a:off x="4464000" y="2718360"/>
+            <a:ext cx="755280" cy="358920"/>
           </a:xfrm>
           <a:prstGeom prst="bentConnector3">
             <a:avLst>
@@ -10189,8 +10214,8 @@
         </p:nvSpPr>
         <p:spPr>
           <a:xfrm>
-            <a:off x="7092360" y="3276000"/>
-            <a:ext cx="1006920" cy="467280"/>
+            <a:off x="7092360" y="3276360"/>
+            <a:ext cx="1006560" cy="466920"/>
           </a:xfrm>
           <a:prstGeom prst="roundRect">
             <a:avLst>
@@ -10250,8 +10275,8 @@
         </p:nvSpPr>
         <p:spPr>
           <a:xfrm>
-            <a:off x="6299640" y="3077640"/>
-            <a:ext cx="792360" cy="432000"/>
+            <a:off x="6299640" y="3078000"/>
+            <a:ext cx="792000" cy="431640"/>
           </a:xfrm>
           <a:prstGeom prst="bentConnector3">
             <a:avLst>
@@ -10282,7 +10307,7 @@
         <p:spPr>
           <a:xfrm>
             <a:off x="1260000" y="2052720"/>
-            <a:ext cx="641880" cy="325800"/>
+            <a:ext cx="641520" cy="325440"/>
           </a:xfrm>
           <a:prstGeom prst="bentConnector3">
             <a:avLst>
@@ -10313,7 +10338,7 @@
         <p:spPr>
           <a:xfrm>
             <a:off x="312120" y="292680"/>
-            <a:ext cx="8519400" cy="571680"/>
+            <a:ext cx="8519040" cy="571320"/>
           </a:xfrm>
           <a:prstGeom prst="rect">
             <a:avLst/>
@@ -10367,7 +10392,7 @@
         <p:spPr>
           <a:xfrm>
             <a:off x="3744360" y="1872360"/>
-            <a:ext cx="718920" cy="467280"/>
+            <a:ext cx="718560" cy="466920"/>
           </a:xfrm>
           <a:prstGeom prst="roundRect">
             <a:avLst>

</xml_diff>